<commit_message>
Paper update before SIGIR writeup
</commit_message>
<xml_diff>
--- a/Paper/Figures/MMA-paper.pptx
+++ b/Paper/Figures/MMA-paper.pptx
@@ -6,6 +6,7 @@
   </p:sldMasterIdLst>
   <p:sldIdLst>
     <p:sldId id="256" r:id="rId2"/>
+    <p:sldId id="257" r:id="rId3"/>
   </p:sldIdLst>
   <p:sldSz cx="12192000" cy="6858000"/>
   <p:notesSz cx="6858000" cy="9144000"/>
@@ -252,7 +253,7 @@
           <a:p>
             <a:fld id="{846CE7D5-CF57-46EF-B807-FDD0502418D4}" type="datetimeFigureOut">
               <a:rPr lang="en-US" smtClean="0"/>
-              <a:t>1/12/22</a:t>
+              <a:t>1/21/22</a:t>
             </a:fld>
             <a:endParaRPr lang="en-US"/>
           </a:p>
@@ -422,7 +423,7 @@
           <a:p>
             <a:fld id="{846CE7D5-CF57-46EF-B807-FDD0502418D4}" type="datetimeFigureOut">
               <a:rPr lang="en-US" smtClean="0"/>
-              <a:t>1/12/22</a:t>
+              <a:t>1/21/22</a:t>
             </a:fld>
             <a:endParaRPr lang="en-US"/>
           </a:p>
@@ -602,7 +603,7 @@
           <a:p>
             <a:fld id="{846CE7D5-CF57-46EF-B807-FDD0502418D4}" type="datetimeFigureOut">
               <a:rPr lang="en-US" smtClean="0"/>
-              <a:t>1/12/22</a:t>
+              <a:t>1/21/22</a:t>
             </a:fld>
             <a:endParaRPr lang="en-US"/>
           </a:p>
@@ -772,7 +773,7 @@
           <a:p>
             <a:fld id="{846CE7D5-CF57-46EF-B807-FDD0502418D4}" type="datetimeFigureOut">
               <a:rPr lang="en-US" smtClean="0"/>
-              <a:t>1/12/22</a:t>
+              <a:t>1/21/22</a:t>
             </a:fld>
             <a:endParaRPr lang="en-US"/>
           </a:p>
@@ -1018,7 +1019,7 @@
           <a:p>
             <a:fld id="{846CE7D5-CF57-46EF-B807-FDD0502418D4}" type="datetimeFigureOut">
               <a:rPr lang="en-US" smtClean="0"/>
-              <a:t>1/12/22</a:t>
+              <a:t>1/21/22</a:t>
             </a:fld>
             <a:endParaRPr lang="en-US"/>
           </a:p>
@@ -1250,7 +1251,7 @@
           <a:p>
             <a:fld id="{846CE7D5-CF57-46EF-B807-FDD0502418D4}" type="datetimeFigureOut">
               <a:rPr lang="en-US" smtClean="0"/>
-              <a:t>1/12/22</a:t>
+              <a:t>1/21/22</a:t>
             </a:fld>
             <a:endParaRPr lang="en-US"/>
           </a:p>
@@ -1617,7 +1618,7 @@
           <a:p>
             <a:fld id="{846CE7D5-CF57-46EF-B807-FDD0502418D4}" type="datetimeFigureOut">
               <a:rPr lang="en-US" smtClean="0"/>
-              <a:t>1/12/22</a:t>
+              <a:t>1/21/22</a:t>
             </a:fld>
             <a:endParaRPr lang="en-US"/>
           </a:p>
@@ -1735,7 +1736,7 @@
           <a:p>
             <a:fld id="{846CE7D5-CF57-46EF-B807-FDD0502418D4}" type="datetimeFigureOut">
               <a:rPr lang="en-US" smtClean="0"/>
-              <a:t>1/12/22</a:t>
+              <a:t>1/21/22</a:t>
             </a:fld>
             <a:endParaRPr lang="en-US"/>
           </a:p>
@@ -1830,7 +1831,7 @@
           <a:p>
             <a:fld id="{846CE7D5-CF57-46EF-B807-FDD0502418D4}" type="datetimeFigureOut">
               <a:rPr lang="en-US" smtClean="0"/>
-              <a:t>1/12/22</a:t>
+              <a:t>1/21/22</a:t>
             </a:fld>
             <a:endParaRPr lang="en-US"/>
           </a:p>
@@ -2107,7 +2108,7 @@
           <a:p>
             <a:fld id="{846CE7D5-CF57-46EF-B807-FDD0502418D4}" type="datetimeFigureOut">
               <a:rPr lang="en-US" smtClean="0"/>
-              <a:t>1/12/22</a:t>
+              <a:t>1/21/22</a:t>
             </a:fld>
             <a:endParaRPr lang="en-US"/>
           </a:p>
@@ -2364,7 +2365,7 @@
           <a:p>
             <a:fld id="{846CE7D5-CF57-46EF-B807-FDD0502418D4}" type="datetimeFigureOut">
               <a:rPr lang="en-US" smtClean="0"/>
-              <a:t>1/12/22</a:t>
+              <a:t>1/21/22</a:t>
             </a:fld>
             <a:endParaRPr lang="en-US"/>
           </a:p>
@@ -2577,7 +2578,7 @@
           <a:p>
             <a:fld id="{846CE7D5-CF57-46EF-B807-FDD0502418D4}" type="datetimeFigureOut">
               <a:rPr lang="en-US" smtClean="0"/>
-              <a:t>1/12/22</a:t>
+              <a:t>1/21/22</a:t>
             </a:fld>
             <a:endParaRPr lang="en-US"/>
           </a:p>
@@ -3666,6 +3667,694 @@
 </p:sld>
 </file>
 
+<file path=ppt/slides/slide2.xml><?xml version="1.0" encoding="utf-8"?>
+<p:sld xmlns:a="http://schemas.openxmlformats.org/drawingml/2006/main" xmlns:r="http://schemas.openxmlformats.org/officeDocument/2006/relationships" xmlns:p="http://schemas.openxmlformats.org/presentationml/2006/main">
+  <p:cSld>
+    <p:spTree>
+      <p:nvGrpSpPr>
+        <p:cNvPr id="1" name=""/>
+        <p:cNvGrpSpPr/>
+        <p:nvPr/>
+      </p:nvGrpSpPr>
+      <p:grpSpPr>
+        <a:xfrm>
+          <a:off x="0" y="0"/>
+          <a:ext cx="0" cy="0"/>
+          <a:chOff x="0" y="0"/>
+          <a:chExt cx="0" cy="0"/>
+        </a:xfrm>
+      </p:grpSpPr>
+      <p:sp>
+        <p:nvSpPr>
+          <p:cNvPr id="9" name="TextBox 8">
+            <a:extLst>
+              <a:ext uri="{FF2B5EF4-FFF2-40B4-BE49-F238E27FC236}">
+                <a16:creationId xmlns:a16="http://schemas.microsoft.com/office/drawing/2014/main" id="{4CD4BF62-8CAE-4091-B9D5-744149C3790A}"/>
+              </a:ext>
+            </a:extLst>
+          </p:cNvPr>
+          <p:cNvSpPr txBox="1"/>
+          <p:nvPr/>
+        </p:nvSpPr>
+        <p:spPr>
+          <a:xfrm>
+            <a:off x="451295" y="640125"/>
+            <a:ext cx="1893536" cy="707886"/>
+          </a:xfrm>
+          <a:prstGeom prst="rect">
+            <a:avLst/>
+          </a:prstGeom>
+          <a:noFill/>
+        </p:spPr>
+        <p:txBody>
+          <a:bodyPr rot="0" spcFirstLastPara="0" vertOverflow="overflow" horzOverflow="overflow" vert="horz" wrap="square" lIns="91440" tIns="45720" rIns="91440" bIns="45720" numCol="1" spcCol="0" rtlCol="0" fromWordArt="0" anchor="t" anchorCtr="0" forceAA="0" compatLnSpc="1">
+            <a:prstTxWarp prst="textNoShape">
+              <a:avLst/>
+            </a:prstTxWarp>
+            <a:spAutoFit/>
+          </a:bodyPr>
+          <a:lstStyle/>
+          <a:p>
+            <a:pPr algn="r"/>
+            <a:r>
+              <a:rPr lang="en-US" sz="2000" dirty="0">
+                <a:latin typeface="Arial"/>
+                <a:cs typeface="Arial"/>
+              </a:rPr>
+              <a:t>Modality 1: Text</a:t>
+            </a:r>
+            <a:endParaRPr lang="en-US" sz="2000">
+              <a:cs typeface="Calibri"/>
+            </a:endParaRPr>
+          </a:p>
+        </p:txBody>
+      </p:sp>
+      <p:sp>
+        <p:nvSpPr>
+          <p:cNvPr id="13" name="TextBox 12">
+            <a:extLst>
+              <a:ext uri="{FF2B5EF4-FFF2-40B4-BE49-F238E27FC236}">
+                <a16:creationId xmlns:a16="http://schemas.microsoft.com/office/drawing/2014/main" id="{49E2360F-AA9C-4B47-A608-832523390A51}"/>
+              </a:ext>
+            </a:extLst>
+          </p:cNvPr>
+          <p:cNvSpPr txBox="1"/>
+          <p:nvPr/>
+        </p:nvSpPr>
+        <p:spPr>
+          <a:xfrm>
+            <a:off x="451294" y="4139930"/>
+            <a:ext cx="1893536" cy="707886"/>
+          </a:xfrm>
+          <a:prstGeom prst="rect">
+            <a:avLst/>
+          </a:prstGeom>
+          <a:noFill/>
+        </p:spPr>
+        <p:txBody>
+          <a:bodyPr rot="0" spcFirstLastPara="0" vertOverflow="overflow" horzOverflow="overflow" vert="horz" wrap="square" lIns="91440" tIns="45720" rIns="91440" bIns="45720" numCol="1" spcCol="0" rtlCol="0" fromWordArt="0" anchor="t" anchorCtr="0" forceAA="0" compatLnSpc="1">
+            <a:prstTxWarp prst="textNoShape">
+              <a:avLst/>
+            </a:prstTxWarp>
+            <a:spAutoFit/>
+          </a:bodyPr>
+          <a:lstStyle/>
+          <a:p>
+            <a:pPr algn="r"/>
+            <a:r>
+              <a:rPr lang="en-US" sz="2000" dirty="0">
+                <a:latin typeface="Arial"/>
+                <a:cs typeface="Arial"/>
+              </a:rPr>
+              <a:t>Modality 3: Depth</a:t>
+            </a:r>
+            <a:endParaRPr lang="en-US" sz="2000" dirty="0">
+              <a:cs typeface="Calibri"/>
+            </a:endParaRPr>
+          </a:p>
+        </p:txBody>
+      </p:sp>
+      <p:sp>
+        <p:nvSpPr>
+          <p:cNvPr id="15" name="TextBox 14">
+            <a:extLst>
+              <a:ext uri="{FF2B5EF4-FFF2-40B4-BE49-F238E27FC236}">
+                <a16:creationId xmlns:a16="http://schemas.microsoft.com/office/drawing/2014/main" id="{B5C8CF98-A304-4503-9310-E0CFE97058DF}"/>
+              </a:ext>
+            </a:extLst>
+          </p:cNvPr>
+          <p:cNvSpPr txBox="1"/>
+          <p:nvPr/>
+        </p:nvSpPr>
+        <p:spPr>
+          <a:xfrm>
+            <a:off x="451294" y="2325966"/>
+            <a:ext cx="1893536" cy="707886"/>
+          </a:xfrm>
+          <a:prstGeom prst="rect">
+            <a:avLst/>
+          </a:prstGeom>
+          <a:noFill/>
+        </p:spPr>
+        <p:txBody>
+          <a:bodyPr rot="0" spcFirstLastPara="0" vertOverflow="overflow" horzOverflow="overflow" vert="horz" wrap="square" lIns="91440" tIns="45720" rIns="91440" bIns="45720" numCol="1" spcCol="0" rtlCol="0" fromWordArt="0" anchor="t" anchorCtr="0" forceAA="0" compatLnSpc="1">
+            <a:prstTxWarp prst="textNoShape">
+              <a:avLst/>
+            </a:prstTxWarp>
+            <a:spAutoFit/>
+          </a:bodyPr>
+          <a:lstStyle/>
+          <a:p>
+            <a:pPr algn="r"/>
+            <a:r>
+              <a:rPr lang="en-US" sz="2000" dirty="0">
+                <a:latin typeface="Arial"/>
+                <a:cs typeface="Arial"/>
+              </a:rPr>
+              <a:t>Modality 2: RGB</a:t>
+            </a:r>
+            <a:endParaRPr lang="en-US" sz="2000" dirty="0">
+              <a:cs typeface="Calibri"/>
+            </a:endParaRPr>
+          </a:p>
+        </p:txBody>
+      </p:sp>
+      <p:sp>
+        <p:nvSpPr>
+          <p:cNvPr id="11" name="Rectangle: Rounded Corners 10">
+            <a:extLst>
+              <a:ext uri="{FF2B5EF4-FFF2-40B4-BE49-F238E27FC236}">
+                <a16:creationId xmlns:a16="http://schemas.microsoft.com/office/drawing/2014/main" id="{5B6E86F0-14B8-4A31-BD4E-D6146C992D25}"/>
+              </a:ext>
+            </a:extLst>
+          </p:cNvPr>
+          <p:cNvSpPr/>
+          <p:nvPr/>
+        </p:nvSpPr>
+        <p:spPr>
+          <a:xfrm>
+            <a:off x="2929240" y="284437"/>
+            <a:ext cx="2407380" cy="917097"/>
+          </a:xfrm>
+          <a:prstGeom prst="roundRect">
+            <a:avLst/>
+          </a:prstGeom>
+          <a:solidFill>
+            <a:schemeClr val="bg2"/>
+          </a:solidFill>
+          <a:ln>
+            <a:solidFill>
+              <a:schemeClr val="accent1"/>
+            </a:solidFill>
+          </a:ln>
+        </p:spPr>
+        <p:style>
+          <a:lnRef idx="2">
+            <a:schemeClr val="accent1">
+              <a:shade val="50000"/>
+            </a:schemeClr>
+          </a:lnRef>
+          <a:fillRef idx="1">
+            <a:schemeClr val="accent1"/>
+          </a:fillRef>
+          <a:effectRef idx="0">
+            <a:schemeClr val="accent1"/>
+          </a:effectRef>
+          <a:fontRef idx="minor">
+            <a:schemeClr val="lt1"/>
+          </a:fontRef>
+        </p:style>
+        <p:txBody>
+          <a:bodyPr rtlCol="0" anchor="ctr"/>
+          <a:lstStyle/>
+          <a:p>
+            <a:pPr algn="ctr"/>
+            <a:r>
+              <a:rPr lang="en-US" sz="2000" dirty="0">
+                <a:solidFill>
+                  <a:srgbClr val="000000"/>
+                </a:solidFill>
+                <a:latin typeface="Arial"/>
+                <a:cs typeface="Arial"/>
+              </a:rPr>
+              <a:t>This is a red apple.</a:t>
+            </a:r>
+            <a:endParaRPr lang="en-US" sz="2000" dirty="0">
+              <a:solidFill>
+                <a:srgbClr val="000000"/>
+              </a:solidFill>
+              <a:ea typeface="+mn-lt"/>
+              <a:cs typeface="+mn-lt"/>
+            </a:endParaRPr>
+          </a:p>
+        </p:txBody>
+      </p:sp>
+      <p:sp>
+        <p:nvSpPr>
+          <p:cNvPr id="16" name="Rectangle: Rounded Corners 15">
+            <a:extLst>
+              <a:ext uri="{FF2B5EF4-FFF2-40B4-BE49-F238E27FC236}">
+                <a16:creationId xmlns:a16="http://schemas.microsoft.com/office/drawing/2014/main" id="{97C9E97C-05D7-44DE-97B0-46D383EA1A0C}"/>
+              </a:ext>
+            </a:extLst>
+          </p:cNvPr>
+          <p:cNvSpPr/>
+          <p:nvPr/>
+        </p:nvSpPr>
+        <p:spPr>
+          <a:xfrm>
+            <a:off x="6560550" y="248814"/>
+            <a:ext cx="2407380" cy="917097"/>
+          </a:xfrm>
+          <a:prstGeom prst="roundRect">
+            <a:avLst/>
+          </a:prstGeom>
+          <a:solidFill>
+            <a:schemeClr val="bg2"/>
+          </a:solidFill>
+          <a:ln>
+            <a:solidFill>
+              <a:schemeClr val="accent1"/>
+            </a:solidFill>
+          </a:ln>
+        </p:spPr>
+        <p:style>
+          <a:lnRef idx="2">
+            <a:schemeClr val="accent1">
+              <a:shade val="50000"/>
+            </a:schemeClr>
+          </a:lnRef>
+          <a:fillRef idx="1">
+            <a:schemeClr val="accent1"/>
+          </a:fillRef>
+          <a:effectRef idx="0">
+            <a:schemeClr val="accent1"/>
+          </a:effectRef>
+          <a:fontRef idx="minor">
+            <a:schemeClr val="lt1"/>
+          </a:fontRef>
+        </p:style>
+        <p:txBody>
+          <a:bodyPr lIns="91440" tIns="45720" rIns="91440" bIns="45720" rtlCol="0" anchor="ctr"/>
+          <a:lstStyle/>
+          <a:p>
+            <a:pPr algn="ctr"/>
+            <a:r>
+              <a:rPr lang="en-US" sz="2000" dirty="0">
+                <a:solidFill>
+                  <a:srgbClr val="000000"/>
+                </a:solidFill>
+                <a:latin typeface="Arial"/>
+                <a:cs typeface="Arial"/>
+              </a:rPr>
+              <a:t>A coffee mug.</a:t>
+            </a:r>
+          </a:p>
+        </p:txBody>
+      </p:sp>
+      <p:cxnSp>
+        <p:nvCxnSpPr>
+          <p:cNvPr id="21" name="Straight Arrow Connector 20">
+            <a:extLst>
+              <a:ext uri="{FF2B5EF4-FFF2-40B4-BE49-F238E27FC236}">
+                <a16:creationId xmlns:a16="http://schemas.microsoft.com/office/drawing/2014/main" id="{FDEE1BC4-6FD7-4958-80BC-578C514F03E0}"/>
+              </a:ext>
+            </a:extLst>
+          </p:cNvPr>
+          <p:cNvCxnSpPr>
+            <a:cxnSpLocks/>
+            <a:stCxn id="11" idx="3"/>
+            <a:endCxn id="12" idx="1"/>
+          </p:cNvCxnSpPr>
+          <p:nvPr/>
+        </p:nvCxnSpPr>
+        <p:spPr>
+          <a:xfrm>
+            <a:off x="5336620" y="742986"/>
+            <a:ext cx="1610790" cy="1778330"/>
+          </a:xfrm>
+          <a:prstGeom prst="straightConnector1">
+            <a:avLst/>
+          </a:prstGeom>
+          <a:ln w="53975">
+            <a:headEnd type="stealth"/>
+            <a:tailEnd type="triangle"/>
+          </a:ln>
+        </p:spPr>
+        <p:style>
+          <a:lnRef idx="1">
+            <a:schemeClr val="accent2"/>
+          </a:lnRef>
+          <a:fillRef idx="0">
+            <a:schemeClr val="accent2"/>
+          </a:fillRef>
+          <a:effectRef idx="0">
+            <a:schemeClr val="accent2"/>
+          </a:effectRef>
+          <a:fontRef idx="minor">
+            <a:schemeClr val="tx1"/>
+          </a:fontRef>
+        </p:style>
+      </p:cxnSp>
+      <p:pic>
+        <p:nvPicPr>
+          <p:cNvPr id="8" name="Picture 7">
+            <a:extLst>
+              <a:ext uri="{FF2B5EF4-FFF2-40B4-BE49-F238E27FC236}">
+                <a16:creationId xmlns:a16="http://schemas.microsoft.com/office/drawing/2014/main" id="{3121C7FF-5EA7-2249-A6E9-0E17192AD540}"/>
+              </a:ext>
+            </a:extLst>
+          </p:cNvPr>
+          <p:cNvPicPr>
+            <a:picLocks noChangeAspect="1"/>
+          </p:cNvPicPr>
+          <p:nvPr/>
+        </p:nvPicPr>
+        <p:blipFill rotWithShape="1">
+          <a:blip r:embed="rId2">
+            <a:extLst>
+              <a:ext uri="{28A0092B-C50C-407E-A947-70E740481C1C}">
+                <a14:useLocalDpi xmlns:a14="http://schemas.microsoft.com/office/drawing/2010/main" val="0"/>
+              </a:ext>
+            </a:extLst>
+          </a:blip>
+          <a:srcRect l="21698" t="24740" r="21141" b="21048"/>
+          <a:stretch/>
+        </p:blipFill>
+        <p:spPr>
+          <a:xfrm>
+            <a:off x="3643399" y="2062768"/>
+            <a:ext cx="966996" cy="917097"/>
+          </a:xfrm>
+          <a:prstGeom prst="rect">
+            <a:avLst/>
+          </a:prstGeom>
+        </p:spPr>
+      </p:pic>
+      <p:pic>
+        <p:nvPicPr>
+          <p:cNvPr id="12" name="Picture 11">
+            <a:extLst>
+              <a:ext uri="{FF2B5EF4-FFF2-40B4-BE49-F238E27FC236}">
+                <a16:creationId xmlns:a16="http://schemas.microsoft.com/office/drawing/2014/main" id="{A5D88BC5-0470-874E-BCF9-F9B8E26A6DC1}"/>
+              </a:ext>
+            </a:extLst>
+          </p:cNvPr>
+          <p:cNvPicPr>
+            <a:picLocks noChangeAspect="1"/>
+          </p:cNvPicPr>
+          <p:nvPr/>
+        </p:nvPicPr>
+        <p:blipFill rotWithShape="1">
+          <a:blip r:embed="rId3">
+            <a:extLst>
+              <a:ext uri="{28A0092B-C50C-407E-A947-70E740481C1C}">
+                <a14:useLocalDpi xmlns:a14="http://schemas.microsoft.com/office/drawing/2010/main" val="0"/>
+              </a:ext>
+            </a:extLst>
+          </a:blip>
+          <a:srcRect l="11261" t="11287" r="10848" b="14798"/>
+          <a:stretch/>
+        </p:blipFill>
+        <p:spPr>
+          <a:xfrm>
+            <a:off x="6947410" y="1895549"/>
+            <a:ext cx="1318873" cy="1251533"/>
+          </a:xfrm>
+          <a:prstGeom prst="rect">
+            <a:avLst/>
+          </a:prstGeom>
+        </p:spPr>
+      </p:pic>
+      <p:cxnSp>
+        <p:nvCxnSpPr>
+          <p:cNvPr id="23" name="Straight Arrow Connector 22">
+            <a:extLst>
+              <a:ext uri="{FF2B5EF4-FFF2-40B4-BE49-F238E27FC236}">
+                <a16:creationId xmlns:a16="http://schemas.microsoft.com/office/drawing/2014/main" id="{31D32616-B42B-D14C-B93B-3FE6A121154D}"/>
+              </a:ext>
+            </a:extLst>
+          </p:cNvPr>
+          <p:cNvCxnSpPr>
+            <a:cxnSpLocks/>
+            <a:stCxn id="11" idx="3"/>
+            <a:endCxn id="17" idx="1"/>
+          </p:cNvCxnSpPr>
+          <p:nvPr/>
+        </p:nvCxnSpPr>
+        <p:spPr>
+          <a:xfrm>
+            <a:off x="5336620" y="742986"/>
+            <a:ext cx="1417970" cy="3624204"/>
+          </a:xfrm>
+          <a:prstGeom prst="straightConnector1">
+            <a:avLst/>
+          </a:prstGeom>
+          <a:ln w="53975">
+            <a:headEnd type="stealth"/>
+            <a:tailEnd type="triangle"/>
+          </a:ln>
+        </p:spPr>
+        <p:style>
+          <a:lnRef idx="1">
+            <a:schemeClr val="accent2"/>
+          </a:lnRef>
+          <a:fillRef idx="0">
+            <a:schemeClr val="accent2"/>
+          </a:fillRef>
+          <a:effectRef idx="0">
+            <a:schemeClr val="accent2"/>
+          </a:effectRef>
+          <a:fontRef idx="minor">
+            <a:schemeClr val="tx1"/>
+          </a:fontRef>
+        </p:style>
+      </p:cxnSp>
+      <p:cxnSp>
+        <p:nvCxnSpPr>
+          <p:cNvPr id="27" name="Elbow Connector 26">
+            <a:extLst>
+              <a:ext uri="{FF2B5EF4-FFF2-40B4-BE49-F238E27FC236}">
+                <a16:creationId xmlns:a16="http://schemas.microsoft.com/office/drawing/2014/main" id="{A43E830E-FC63-E24A-9387-A0E8A2C4D644}"/>
+              </a:ext>
+            </a:extLst>
+          </p:cNvPr>
+          <p:cNvCxnSpPr>
+            <a:cxnSpLocks/>
+            <a:stCxn id="11" idx="1"/>
+            <a:endCxn id="19" idx="1"/>
+          </p:cNvCxnSpPr>
+          <p:nvPr/>
+        </p:nvCxnSpPr>
+        <p:spPr>
+          <a:xfrm rot="10800000" flipH="1" flipV="1">
+            <a:off x="2929240" y="742986"/>
+            <a:ext cx="229586" cy="3624204"/>
+          </a:xfrm>
+          <a:prstGeom prst="bentConnector3">
+            <a:avLst>
+              <a:gd name="adj1" fmla="val -99571"/>
+            </a:avLst>
+          </a:prstGeom>
+          <a:ln w="53975">
+            <a:headEnd type="triangle"/>
+            <a:tailEnd type="triangle"/>
+          </a:ln>
+        </p:spPr>
+        <p:style>
+          <a:lnRef idx="1">
+            <a:schemeClr val="accent1"/>
+          </a:lnRef>
+          <a:fillRef idx="0">
+            <a:schemeClr val="accent1"/>
+          </a:fillRef>
+          <a:effectRef idx="0">
+            <a:schemeClr val="accent1"/>
+          </a:effectRef>
+          <a:fontRef idx="minor">
+            <a:schemeClr val="tx1"/>
+          </a:fontRef>
+        </p:style>
+      </p:cxnSp>
+      <p:cxnSp>
+        <p:nvCxnSpPr>
+          <p:cNvPr id="49" name="Straight Arrow Connector 48">
+            <a:extLst>
+              <a:ext uri="{FF2B5EF4-FFF2-40B4-BE49-F238E27FC236}">
+                <a16:creationId xmlns:a16="http://schemas.microsoft.com/office/drawing/2014/main" id="{A4574602-DE59-984C-961E-A5970C9B00D0}"/>
+              </a:ext>
+            </a:extLst>
+          </p:cNvPr>
+          <p:cNvCxnSpPr>
+            <a:cxnSpLocks/>
+            <a:stCxn id="11" idx="2"/>
+            <a:endCxn id="8" idx="0"/>
+          </p:cNvCxnSpPr>
+          <p:nvPr/>
+        </p:nvCxnSpPr>
+        <p:spPr>
+          <a:xfrm flipH="1">
+            <a:off x="4126897" y="1201534"/>
+            <a:ext cx="6033" cy="861234"/>
+          </a:xfrm>
+          <a:prstGeom prst="straightConnector1">
+            <a:avLst/>
+          </a:prstGeom>
+          <a:ln w="53975">
+            <a:headEnd type="triangle"/>
+            <a:tailEnd type="triangle"/>
+          </a:ln>
+        </p:spPr>
+        <p:style>
+          <a:lnRef idx="1">
+            <a:schemeClr val="accent1"/>
+          </a:lnRef>
+          <a:fillRef idx="0">
+            <a:schemeClr val="accent1"/>
+          </a:fillRef>
+          <a:effectRef idx="0">
+            <a:schemeClr val="accent1"/>
+          </a:effectRef>
+          <a:fontRef idx="minor">
+            <a:schemeClr val="tx1"/>
+          </a:fontRef>
+        </p:style>
+      </p:cxnSp>
+      <p:cxnSp>
+        <p:nvCxnSpPr>
+          <p:cNvPr id="52" name="Straight Connector 51">
+            <a:extLst>
+              <a:ext uri="{FF2B5EF4-FFF2-40B4-BE49-F238E27FC236}">
+                <a16:creationId xmlns:a16="http://schemas.microsoft.com/office/drawing/2014/main" id="{0689C4BA-2C0F-7A4D-A7C3-F34455665C08}"/>
+              </a:ext>
+            </a:extLst>
+          </p:cNvPr>
+          <p:cNvCxnSpPr>
+            <a:cxnSpLocks/>
+            <a:stCxn id="8" idx="3"/>
+            <a:endCxn id="12" idx="1"/>
+          </p:cNvCxnSpPr>
+          <p:nvPr/>
+        </p:nvCxnSpPr>
+        <p:spPr>
+          <a:xfrm flipV="1">
+            <a:off x="4610395" y="2521316"/>
+            <a:ext cx="2337015" cy="1"/>
+          </a:xfrm>
+          <a:prstGeom prst="line">
+            <a:avLst/>
+          </a:prstGeom>
+          <a:ln w="53975"/>
+        </p:spPr>
+        <p:style>
+          <a:lnRef idx="1">
+            <a:schemeClr val="accent6"/>
+          </a:lnRef>
+          <a:fillRef idx="0">
+            <a:schemeClr val="accent6"/>
+          </a:fillRef>
+          <a:effectRef idx="0">
+            <a:schemeClr val="accent6"/>
+          </a:effectRef>
+          <a:fontRef idx="minor">
+            <a:schemeClr val="tx1"/>
+          </a:fontRef>
+        </p:style>
+      </p:cxnSp>
+      <p:cxnSp>
+        <p:nvCxnSpPr>
+          <p:cNvPr id="55" name="Straight Connector 54">
+            <a:extLst>
+              <a:ext uri="{FF2B5EF4-FFF2-40B4-BE49-F238E27FC236}">
+                <a16:creationId xmlns:a16="http://schemas.microsoft.com/office/drawing/2014/main" id="{43CC9506-D993-E14C-8636-A0CB5230A263}"/>
+              </a:ext>
+            </a:extLst>
+          </p:cNvPr>
+          <p:cNvCxnSpPr>
+            <a:cxnSpLocks/>
+            <a:stCxn id="19" idx="3"/>
+            <a:endCxn id="17" idx="1"/>
+          </p:cNvCxnSpPr>
+          <p:nvPr/>
+        </p:nvCxnSpPr>
+        <p:spPr>
+          <a:xfrm>
+            <a:off x="5178126" y="4367190"/>
+            <a:ext cx="1576464" cy="0"/>
+          </a:xfrm>
+          <a:prstGeom prst="line">
+            <a:avLst/>
+          </a:prstGeom>
+          <a:ln w="53975"/>
+        </p:spPr>
+        <p:style>
+          <a:lnRef idx="1">
+            <a:schemeClr val="accent6"/>
+          </a:lnRef>
+          <a:fillRef idx="0">
+            <a:schemeClr val="accent6"/>
+          </a:fillRef>
+          <a:effectRef idx="0">
+            <a:schemeClr val="accent6"/>
+          </a:effectRef>
+          <a:fontRef idx="minor">
+            <a:schemeClr val="tx1"/>
+          </a:fontRef>
+        </p:style>
+      </p:cxnSp>
+      <p:pic>
+        <p:nvPicPr>
+          <p:cNvPr id="17" name="Picture 16">
+            <a:extLst>
+              <a:ext uri="{FF2B5EF4-FFF2-40B4-BE49-F238E27FC236}">
+                <a16:creationId xmlns:a16="http://schemas.microsoft.com/office/drawing/2014/main" id="{DEB648D3-A97D-2C4B-9BBD-1505A66CED7E}"/>
+              </a:ext>
+            </a:extLst>
+          </p:cNvPr>
+          <p:cNvPicPr>
+            <a:picLocks noChangeAspect="1"/>
+          </p:cNvPicPr>
+          <p:nvPr/>
+        </p:nvPicPr>
+        <p:blipFill>
+          <a:blip r:embed="rId4"/>
+          <a:stretch>
+            <a:fillRect/>
+          </a:stretch>
+        </p:blipFill>
+        <p:spPr>
+          <a:xfrm>
+            <a:off x="6754590" y="3363890"/>
+            <a:ext cx="2019300" cy="2006600"/>
+          </a:xfrm>
+          <a:prstGeom prst="rect">
+            <a:avLst/>
+          </a:prstGeom>
+        </p:spPr>
+      </p:pic>
+      <p:pic>
+        <p:nvPicPr>
+          <p:cNvPr id="19" name="Picture 18">
+            <a:extLst>
+              <a:ext uri="{FF2B5EF4-FFF2-40B4-BE49-F238E27FC236}">
+                <a16:creationId xmlns:a16="http://schemas.microsoft.com/office/drawing/2014/main" id="{42D8E108-F44E-B94D-8D58-E41CA252EF05}"/>
+              </a:ext>
+            </a:extLst>
+          </p:cNvPr>
+          <p:cNvPicPr>
+            <a:picLocks noChangeAspect="1"/>
+          </p:cNvPicPr>
+          <p:nvPr/>
+        </p:nvPicPr>
+        <p:blipFill>
+          <a:blip r:embed="rId5"/>
+          <a:stretch>
+            <a:fillRect/>
+          </a:stretch>
+        </p:blipFill>
+        <p:spPr>
+          <a:xfrm>
+            <a:off x="3158826" y="3363890"/>
+            <a:ext cx="2019300" cy="2006600"/>
+          </a:xfrm>
+          <a:prstGeom prst="rect">
+            <a:avLst/>
+          </a:prstGeom>
+        </p:spPr>
+      </p:pic>
+    </p:spTree>
+    <p:extLst>
+      <p:ext uri="{BB962C8B-B14F-4D97-AF65-F5344CB8AC3E}">
+        <p14:creationId xmlns:p14="http://schemas.microsoft.com/office/powerpoint/2010/main" val="2056385100"/>
+      </p:ext>
+    </p:extLst>
+  </p:cSld>
+  <p:clrMapOvr>
+    <a:masterClrMapping/>
+  </p:clrMapOvr>
+</p:sld>
+</file>
+
 <file path=ppt/theme/theme1.xml><?xml version="1.0" encoding="utf-8"?>
 <a:theme xmlns:a="http://schemas.openxmlformats.org/drawingml/2006/main" name="office theme">
   <a:themeElements>

</xml_diff>

<commit_message>
Paper submitted to SIGIR 23
</commit_message>
<xml_diff>
--- a/Paper/Figures/MMA-paper.pptx
+++ b/Paper/Figures/MMA-paper.pptx
@@ -19,6 +19,7 @@
     <p:sldId id="265" r:id="rId13"/>
     <p:sldId id="268" r:id="rId14"/>
     <p:sldId id="269" r:id="rId15"/>
+    <p:sldId id="270" r:id="rId16"/>
   </p:sldIdLst>
   <p:sldSz cx="12192000" cy="6858000"/>
   <p:notesSz cx="6858000" cy="9144000"/>
@@ -265,7 +266,7 @@
           <a:p>
             <a:fld id="{846CE7D5-CF57-46EF-B807-FDD0502418D4}" type="datetimeFigureOut">
               <a:rPr lang="en-US" smtClean="0"/>
-              <a:t>8/11/22</a:t>
+              <a:t>1/31/23</a:t>
             </a:fld>
             <a:endParaRPr lang="en-US"/>
           </a:p>
@@ -435,7 +436,7 @@
           <a:p>
             <a:fld id="{846CE7D5-CF57-46EF-B807-FDD0502418D4}" type="datetimeFigureOut">
               <a:rPr lang="en-US" smtClean="0"/>
-              <a:t>8/11/22</a:t>
+              <a:t>1/31/23</a:t>
             </a:fld>
             <a:endParaRPr lang="en-US"/>
           </a:p>
@@ -615,7 +616,7 @@
           <a:p>
             <a:fld id="{846CE7D5-CF57-46EF-B807-FDD0502418D4}" type="datetimeFigureOut">
               <a:rPr lang="en-US" smtClean="0"/>
-              <a:t>8/11/22</a:t>
+              <a:t>1/31/23</a:t>
             </a:fld>
             <a:endParaRPr lang="en-US"/>
           </a:p>
@@ -785,7 +786,7 @@
           <a:p>
             <a:fld id="{846CE7D5-CF57-46EF-B807-FDD0502418D4}" type="datetimeFigureOut">
               <a:rPr lang="en-US" smtClean="0"/>
-              <a:t>8/11/22</a:t>
+              <a:t>1/31/23</a:t>
             </a:fld>
             <a:endParaRPr lang="en-US"/>
           </a:p>
@@ -1031,7 +1032,7 @@
           <a:p>
             <a:fld id="{846CE7D5-CF57-46EF-B807-FDD0502418D4}" type="datetimeFigureOut">
               <a:rPr lang="en-US" smtClean="0"/>
-              <a:t>8/11/22</a:t>
+              <a:t>1/31/23</a:t>
             </a:fld>
             <a:endParaRPr lang="en-US"/>
           </a:p>
@@ -1263,7 +1264,7 @@
           <a:p>
             <a:fld id="{846CE7D5-CF57-46EF-B807-FDD0502418D4}" type="datetimeFigureOut">
               <a:rPr lang="en-US" smtClean="0"/>
-              <a:t>8/11/22</a:t>
+              <a:t>1/31/23</a:t>
             </a:fld>
             <a:endParaRPr lang="en-US"/>
           </a:p>
@@ -1630,7 +1631,7 @@
           <a:p>
             <a:fld id="{846CE7D5-CF57-46EF-B807-FDD0502418D4}" type="datetimeFigureOut">
               <a:rPr lang="en-US" smtClean="0"/>
-              <a:t>8/11/22</a:t>
+              <a:t>1/31/23</a:t>
             </a:fld>
             <a:endParaRPr lang="en-US"/>
           </a:p>
@@ -1748,7 +1749,7 @@
           <a:p>
             <a:fld id="{846CE7D5-CF57-46EF-B807-FDD0502418D4}" type="datetimeFigureOut">
               <a:rPr lang="en-US" smtClean="0"/>
-              <a:t>8/11/22</a:t>
+              <a:t>1/31/23</a:t>
             </a:fld>
             <a:endParaRPr lang="en-US"/>
           </a:p>
@@ -1843,7 +1844,7 @@
           <a:p>
             <a:fld id="{846CE7D5-CF57-46EF-B807-FDD0502418D4}" type="datetimeFigureOut">
               <a:rPr lang="en-US" smtClean="0"/>
-              <a:t>8/11/22</a:t>
+              <a:t>1/31/23</a:t>
             </a:fld>
             <a:endParaRPr lang="en-US"/>
           </a:p>
@@ -2120,7 +2121,7 @@
           <a:p>
             <a:fld id="{846CE7D5-CF57-46EF-B807-FDD0502418D4}" type="datetimeFigureOut">
               <a:rPr lang="en-US" smtClean="0"/>
-              <a:t>8/11/22</a:t>
+              <a:t>1/31/23</a:t>
             </a:fld>
             <a:endParaRPr lang="en-US"/>
           </a:p>
@@ -2377,7 +2378,7 @@
           <a:p>
             <a:fld id="{846CE7D5-CF57-46EF-B807-FDD0502418D4}" type="datetimeFigureOut">
               <a:rPr lang="en-US" smtClean="0"/>
-              <a:t>8/11/22</a:t>
+              <a:t>1/31/23</a:t>
             </a:fld>
             <a:endParaRPr lang="en-US"/>
           </a:p>
@@ -2590,7 +2591,7 @@
           <a:p>
             <a:fld id="{846CE7D5-CF57-46EF-B807-FDD0502418D4}" type="datetimeFigureOut">
               <a:rPr lang="en-US" smtClean="0"/>
-              <a:t>8/11/22</a:t>
+              <a:t>1/31/23</a:t>
             </a:fld>
             <a:endParaRPr lang="en-US"/>
           </a:p>
@@ -6976,7 +6977,7 @@
         </p:nvSpPr>
         <p:spPr>
           <a:xfrm>
-            <a:off x="5712472" y="5916453"/>
+            <a:off x="10346782" y="2280117"/>
             <a:ext cx="777396" cy="338554"/>
           </a:xfrm>
           <a:prstGeom prst="rect">
@@ -7011,7 +7012,7 @@
         </p:nvSpPr>
         <p:spPr>
           <a:xfrm>
-            <a:off x="6489868" y="5715935"/>
+            <a:off x="9637014" y="2621040"/>
             <a:ext cx="2196932" cy="739590"/>
           </a:xfrm>
           <a:prstGeom prst="wedgeRectCallout">
@@ -8335,6 +8336,3210 @@
     <p:extLst>
       <p:ext uri="{BB962C8B-B14F-4D97-AF65-F5344CB8AC3E}">
         <p14:creationId xmlns:p14="http://schemas.microsoft.com/office/powerpoint/2010/main" val="1058742943"/>
+      </p:ext>
+    </p:extLst>
+  </p:cSld>
+  <p:clrMapOvr>
+    <a:masterClrMapping/>
+  </p:clrMapOvr>
+</p:sld>
+</file>
+
+<file path=ppt/slides/slide15.xml><?xml version="1.0" encoding="utf-8"?>
+<p:sld xmlns:a="http://schemas.openxmlformats.org/drawingml/2006/main" xmlns:r="http://schemas.openxmlformats.org/officeDocument/2006/relationships" xmlns:p="http://schemas.openxmlformats.org/presentationml/2006/main">
+  <p:cSld>
+    <p:spTree>
+      <p:nvGrpSpPr>
+        <p:cNvPr id="1" name=""/>
+        <p:cNvGrpSpPr/>
+        <p:nvPr/>
+      </p:nvGrpSpPr>
+      <p:grpSpPr>
+        <a:xfrm>
+          <a:off x="0" y="0"/>
+          <a:ext cx="0" cy="0"/>
+          <a:chOff x="0" y="0"/>
+          <a:chExt cx="0" cy="0"/>
+        </a:xfrm>
+      </p:grpSpPr>
+      <p:sp>
+        <p:nvSpPr>
+          <p:cNvPr id="9" name="TextBox 8">
+            <a:extLst>
+              <a:ext uri="{FF2B5EF4-FFF2-40B4-BE49-F238E27FC236}">
+                <a16:creationId xmlns:a16="http://schemas.microsoft.com/office/drawing/2014/main" id="{4CD4BF62-8CAE-4091-B9D5-744149C3790A}"/>
+              </a:ext>
+            </a:extLst>
+          </p:cNvPr>
+          <p:cNvSpPr txBox="1"/>
+          <p:nvPr/>
+        </p:nvSpPr>
+        <p:spPr>
+          <a:xfrm>
+            <a:off x="188226" y="1179772"/>
+            <a:ext cx="1274686" cy="400110"/>
+          </a:xfrm>
+          <a:prstGeom prst="rect">
+            <a:avLst/>
+          </a:prstGeom>
+          <a:noFill/>
+        </p:spPr>
+        <p:txBody>
+          <a:bodyPr rot="0" spcFirstLastPara="0" vertOverflow="overflow" horzOverflow="overflow" vert="horz" wrap="square" lIns="91440" tIns="45720" rIns="91440" bIns="45720" numCol="1" spcCol="0" rtlCol="0" fromWordArt="0" anchor="t" anchorCtr="0" forceAA="0" compatLnSpc="1">
+            <a:prstTxWarp prst="textNoShape">
+              <a:avLst/>
+            </a:prstTxWarp>
+            <a:spAutoFit/>
+          </a:bodyPr>
+          <a:lstStyle/>
+          <a:p>
+            <a:r>
+              <a:rPr lang="en-US" sz="2000" dirty="0">
+                <a:cs typeface="Arial"/>
+              </a:rPr>
+              <a:t>Text</a:t>
+            </a:r>
+            <a:endParaRPr lang="en-US" sz="2000" dirty="0">
+              <a:cs typeface="Calibri"/>
+            </a:endParaRPr>
+          </a:p>
+        </p:txBody>
+      </p:sp>
+      <p:sp>
+        <p:nvSpPr>
+          <p:cNvPr id="13" name="TextBox 12">
+            <a:extLst>
+              <a:ext uri="{FF2B5EF4-FFF2-40B4-BE49-F238E27FC236}">
+                <a16:creationId xmlns:a16="http://schemas.microsoft.com/office/drawing/2014/main" id="{49E2360F-AA9C-4B47-A608-832523390A51}"/>
+              </a:ext>
+            </a:extLst>
+          </p:cNvPr>
+          <p:cNvSpPr txBox="1"/>
+          <p:nvPr/>
+        </p:nvSpPr>
+        <p:spPr>
+          <a:xfrm>
+            <a:off x="185880" y="3542302"/>
+            <a:ext cx="1319777" cy="400110"/>
+          </a:xfrm>
+          <a:prstGeom prst="rect">
+            <a:avLst/>
+          </a:prstGeom>
+          <a:noFill/>
+        </p:spPr>
+        <p:txBody>
+          <a:bodyPr rot="0" spcFirstLastPara="0" vertOverflow="overflow" horzOverflow="overflow" vert="horz" wrap="square" lIns="91440" tIns="45720" rIns="91440" bIns="45720" numCol="1" spcCol="0" rtlCol="0" fromWordArt="0" anchor="t" anchorCtr="0" forceAA="0" compatLnSpc="1">
+            <a:prstTxWarp prst="textNoShape">
+              <a:avLst/>
+            </a:prstTxWarp>
+            <a:spAutoFit/>
+          </a:bodyPr>
+          <a:lstStyle/>
+          <a:p>
+            <a:r>
+              <a:rPr lang="en-US" sz="2000" dirty="0">
+                <a:cs typeface="Arial"/>
+              </a:rPr>
+              <a:t>Depth</a:t>
+            </a:r>
+            <a:endParaRPr lang="en-US" sz="2000" dirty="0">
+              <a:cs typeface="Calibri"/>
+            </a:endParaRPr>
+          </a:p>
+        </p:txBody>
+      </p:sp>
+      <p:sp>
+        <p:nvSpPr>
+          <p:cNvPr id="15" name="TextBox 14">
+            <a:extLst>
+              <a:ext uri="{FF2B5EF4-FFF2-40B4-BE49-F238E27FC236}">
+                <a16:creationId xmlns:a16="http://schemas.microsoft.com/office/drawing/2014/main" id="{B5C8CF98-A304-4503-9310-E0CFE97058DF}"/>
+              </a:ext>
+            </a:extLst>
+          </p:cNvPr>
+          <p:cNvSpPr txBox="1"/>
+          <p:nvPr/>
+        </p:nvSpPr>
+        <p:spPr>
+          <a:xfrm>
+            <a:off x="195490" y="2265245"/>
+            <a:ext cx="1274686" cy="400110"/>
+          </a:xfrm>
+          <a:prstGeom prst="rect">
+            <a:avLst/>
+          </a:prstGeom>
+          <a:noFill/>
+        </p:spPr>
+        <p:txBody>
+          <a:bodyPr rot="0" spcFirstLastPara="0" vertOverflow="overflow" horzOverflow="overflow" vert="horz" wrap="square" lIns="91440" tIns="45720" rIns="91440" bIns="45720" numCol="1" spcCol="0" rtlCol="0" fromWordArt="0" anchor="t" anchorCtr="0" forceAA="0" compatLnSpc="1">
+            <a:prstTxWarp prst="textNoShape">
+              <a:avLst/>
+            </a:prstTxWarp>
+            <a:spAutoFit/>
+          </a:bodyPr>
+          <a:lstStyle/>
+          <a:p>
+            <a:r>
+              <a:rPr lang="en-US" sz="2000" dirty="0">
+                <a:cs typeface="Arial"/>
+              </a:rPr>
+              <a:t>RGB</a:t>
+            </a:r>
+            <a:endParaRPr lang="en-US" sz="2000" dirty="0">
+              <a:cs typeface="Calibri"/>
+            </a:endParaRPr>
+          </a:p>
+        </p:txBody>
+      </p:sp>
+      <p:sp>
+        <p:nvSpPr>
+          <p:cNvPr id="16" name="Rectangle: Rounded Corners 15">
+            <a:extLst>
+              <a:ext uri="{FF2B5EF4-FFF2-40B4-BE49-F238E27FC236}">
+                <a16:creationId xmlns:a16="http://schemas.microsoft.com/office/drawing/2014/main" id="{97C9E97C-05D7-44DE-97B0-46D383EA1A0C}"/>
+              </a:ext>
+            </a:extLst>
+          </p:cNvPr>
+          <p:cNvSpPr/>
+          <p:nvPr/>
+        </p:nvSpPr>
+        <p:spPr>
+          <a:xfrm>
+            <a:off x="10313878" y="1129100"/>
+            <a:ext cx="1448500" cy="789587"/>
+          </a:xfrm>
+          <a:prstGeom prst="roundRect">
+            <a:avLst/>
+          </a:prstGeom>
+          <a:solidFill>
+            <a:schemeClr val="bg2"/>
+          </a:solidFill>
+          <a:ln>
+            <a:solidFill>
+              <a:schemeClr val="accent1"/>
+            </a:solidFill>
+          </a:ln>
+        </p:spPr>
+        <p:style>
+          <a:lnRef idx="2">
+            <a:schemeClr val="accent1">
+              <a:shade val="50000"/>
+            </a:schemeClr>
+          </a:lnRef>
+          <a:fillRef idx="1">
+            <a:schemeClr val="accent1"/>
+          </a:fillRef>
+          <a:effectRef idx="0">
+            <a:schemeClr val="accent1"/>
+          </a:effectRef>
+          <a:fontRef idx="minor">
+            <a:schemeClr val="lt1"/>
+          </a:fontRef>
+        </p:style>
+        <p:txBody>
+          <a:bodyPr lIns="91440" tIns="45720" rIns="91440" bIns="45720" rtlCol="0" anchor="ctr"/>
+          <a:lstStyle/>
+          <a:p>
+            <a:pPr algn="ctr"/>
+            <a:r>
+              <a:rPr lang="en-US" sz="2400" dirty="0">
+                <a:solidFill>
+                  <a:srgbClr val="000000"/>
+                </a:solidFill>
+                <a:cs typeface="Arial"/>
+              </a:rPr>
+              <a:t>A coffee mug.</a:t>
+            </a:r>
+          </a:p>
+        </p:txBody>
+      </p:sp>
+      <p:pic>
+        <p:nvPicPr>
+          <p:cNvPr id="8" name="Picture 7">
+            <a:extLst>
+              <a:ext uri="{FF2B5EF4-FFF2-40B4-BE49-F238E27FC236}">
+                <a16:creationId xmlns:a16="http://schemas.microsoft.com/office/drawing/2014/main" id="{3121C7FF-5EA7-2249-A6E9-0E17192AD540}"/>
+              </a:ext>
+            </a:extLst>
+          </p:cNvPr>
+          <p:cNvPicPr>
+            <a:picLocks noChangeAspect="1"/>
+          </p:cNvPicPr>
+          <p:nvPr/>
+        </p:nvPicPr>
+        <p:blipFill rotWithShape="1">
+          <a:blip r:embed="rId2">
+            <a:extLst>
+              <a:ext uri="{28A0092B-C50C-407E-A947-70E740481C1C}">
+                <a14:useLocalDpi xmlns:a14="http://schemas.microsoft.com/office/drawing/2010/main" val="0"/>
+              </a:ext>
+            </a:extLst>
+          </a:blip>
+          <a:srcRect l="21698" t="24740" r="21141" b="21048"/>
+          <a:stretch/>
+        </p:blipFill>
+        <p:spPr>
+          <a:xfrm>
+            <a:off x="1700245" y="2177441"/>
+            <a:ext cx="581833" cy="573808"/>
+          </a:xfrm>
+          <a:prstGeom prst="rect">
+            <a:avLst/>
+          </a:prstGeom>
+        </p:spPr>
+      </p:pic>
+      <p:pic>
+        <p:nvPicPr>
+          <p:cNvPr id="12" name="Picture 11">
+            <a:extLst>
+              <a:ext uri="{FF2B5EF4-FFF2-40B4-BE49-F238E27FC236}">
+                <a16:creationId xmlns:a16="http://schemas.microsoft.com/office/drawing/2014/main" id="{A5D88BC5-0470-874E-BCF9-F9B8E26A6DC1}"/>
+              </a:ext>
+            </a:extLst>
+          </p:cNvPr>
+          <p:cNvPicPr>
+            <a:picLocks noChangeAspect="1"/>
+          </p:cNvPicPr>
+          <p:nvPr/>
+        </p:nvPicPr>
+        <p:blipFill rotWithShape="1">
+          <a:blip r:embed="rId3">
+            <a:extLst>
+              <a:ext uri="{28A0092B-C50C-407E-A947-70E740481C1C}">
+                <a14:useLocalDpi xmlns:a14="http://schemas.microsoft.com/office/drawing/2010/main" val="0"/>
+              </a:ext>
+            </a:extLst>
+          </a:blip>
+          <a:srcRect l="11261" t="11287" r="10848" b="14798"/>
+          <a:stretch/>
+        </p:blipFill>
+        <p:spPr>
+          <a:xfrm>
+            <a:off x="10546648" y="2095625"/>
+            <a:ext cx="793554" cy="783057"/>
+          </a:xfrm>
+          <a:prstGeom prst="rect">
+            <a:avLst/>
+          </a:prstGeom>
+        </p:spPr>
+      </p:pic>
+      <p:pic>
+        <p:nvPicPr>
+          <p:cNvPr id="17" name="Picture 16">
+            <a:extLst>
+              <a:ext uri="{FF2B5EF4-FFF2-40B4-BE49-F238E27FC236}">
+                <a16:creationId xmlns:a16="http://schemas.microsoft.com/office/drawing/2014/main" id="{DEB648D3-A97D-2C4B-9BBD-1505A66CED7E}"/>
+              </a:ext>
+            </a:extLst>
+          </p:cNvPr>
+          <p:cNvPicPr>
+            <a:picLocks noChangeAspect="1"/>
+          </p:cNvPicPr>
+          <p:nvPr/>
+        </p:nvPicPr>
+        <p:blipFill>
+          <a:blip r:embed="rId4"/>
+          <a:stretch>
+            <a:fillRect/>
+          </a:stretch>
+        </p:blipFill>
+        <p:spPr>
+          <a:xfrm>
+            <a:off x="10432629" y="3055619"/>
+            <a:ext cx="1214996" cy="1255487"/>
+          </a:xfrm>
+          <a:prstGeom prst="rect">
+            <a:avLst/>
+          </a:prstGeom>
+        </p:spPr>
+      </p:pic>
+      <p:pic>
+        <p:nvPicPr>
+          <p:cNvPr id="19" name="Picture 18">
+            <a:extLst>
+              <a:ext uri="{FF2B5EF4-FFF2-40B4-BE49-F238E27FC236}">
+                <a16:creationId xmlns:a16="http://schemas.microsoft.com/office/drawing/2014/main" id="{42D8E108-F44E-B94D-8D58-E41CA252EF05}"/>
+              </a:ext>
+            </a:extLst>
+          </p:cNvPr>
+          <p:cNvPicPr>
+            <a:picLocks noChangeAspect="1"/>
+          </p:cNvPicPr>
+          <p:nvPr/>
+        </p:nvPicPr>
+        <p:blipFill>
+          <a:blip r:embed="rId5"/>
+          <a:stretch>
+            <a:fillRect/>
+          </a:stretch>
+        </p:blipFill>
+        <p:spPr>
+          <a:xfrm>
+            <a:off x="1353148" y="3078146"/>
+            <a:ext cx="1214996" cy="1255487"/>
+          </a:xfrm>
+          <a:prstGeom prst="rect">
+            <a:avLst/>
+          </a:prstGeom>
+        </p:spPr>
+      </p:pic>
+      <p:pic>
+        <p:nvPicPr>
+          <p:cNvPr id="2" name="Picture 1">
+            <a:extLst>
+              <a:ext uri="{FF2B5EF4-FFF2-40B4-BE49-F238E27FC236}">
+                <a16:creationId xmlns:a16="http://schemas.microsoft.com/office/drawing/2014/main" id="{CDEE996B-C261-7046-B9B2-BC4498BD2C78}"/>
+              </a:ext>
+            </a:extLst>
+          </p:cNvPr>
+          <p:cNvPicPr>
+            <a:picLocks noChangeAspect="1"/>
+          </p:cNvPicPr>
+          <p:nvPr/>
+        </p:nvPicPr>
+        <p:blipFill rotWithShape="1">
+          <a:blip r:embed="rId6">
+            <a:duotone>
+              <a:schemeClr val="accent4">
+                <a:shade val="45000"/>
+                <a:satMod val="135000"/>
+              </a:schemeClr>
+              <a:prstClr val="white"/>
+            </a:duotone>
+          </a:blip>
+          <a:srcRect l="2395" t="33786" r="68940" b="42021"/>
+          <a:stretch/>
+        </p:blipFill>
+        <p:spPr>
+          <a:xfrm>
+            <a:off x="1276945" y="4920170"/>
+            <a:ext cx="1214996" cy="444288"/>
+          </a:xfrm>
+          <a:prstGeom prst="rect">
+            <a:avLst/>
+          </a:prstGeom>
+        </p:spPr>
+      </p:pic>
+      <p:sp>
+        <p:nvSpPr>
+          <p:cNvPr id="3" name="TextBox 2">
+            <a:extLst>
+              <a:ext uri="{FF2B5EF4-FFF2-40B4-BE49-F238E27FC236}">
+                <a16:creationId xmlns:a16="http://schemas.microsoft.com/office/drawing/2014/main" id="{164D7BCD-CA1D-634E-8A8E-777BC50D10C8}"/>
+              </a:ext>
+            </a:extLst>
+          </p:cNvPr>
+          <p:cNvSpPr txBox="1"/>
+          <p:nvPr/>
+        </p:nvSpPr>
+        <p:spPr>
+          <a:xfrm>
+            <a:off x="1477057" y="4434428"/>
+            <a:ext cx="1619704" cy="707886"/>
+          </a:xfrm>
+          <a:prstGeom prst="rect">
+            <a:avLst/>
+          </a:prstGeom>
+          <a:noFill/>
+        </p:spPr>
+        <p:txBody>
+          <a:bodyPr wrap="square" rtlCol="0">
+            <a:spAutoFit/>
+          </a:bodyPr>
+          <a:lstStyle/>
+          <a:p>
+            <a:r>
+              <a:rPr lang="en-US" sz="2000" dirty="0">
+                <a:solidFill>
+                  <a:srgbClr val="000000"/>
+                </a:solidFill>
+                <a:cs typeface="Arial"/>
+              </a:rPr>
+              <a:t>“A Gala apple.”</a:t>
+            </a:r>
+          </a:p>
+        </p:txBody>
+      </p:sp>
+      <p:pic>
+        <p:nvPicPr>
+          <p:cNvPr id="20" name="Picture 19">
+            <a:extLst>
+              <a:ext uri="{FF2B5EF4-FFF2-40B4-BE49-F238E27FC236}">
+                <a16:creationId xmlns:a16="http://schemas.microsoft.com/office/drawing/2014/main" id="{1A2FBDF4-BD4B-2B4C-A8F1-EA5542B438DC}"/>
+              </a:ext>
+            </a:extLst>
+          </p:cNvPr>
+          <p:cNvPicPr>
+            <a:picLocks noChangeAspect="1"/>
+          </p:cNvPicPr>
+          <p:nvPr/>
+        </p:nvPicPr>
+        <p:blipFill rotWithShape="1">
+          <a:blip r:embed="rId6">
+            <a:duotone>
+              <a:schemeClr val="accent4">
+                <a:shade val="45000"/>
+                <a:satMod val="135000"/>
+              </a:schemeClr>
+              <a:prstClr val="white"/>
+            </a:duotone>
+          </a:blip>
+          <a:srcRect l="70129" t="34980" r="1206" b="40827"/>
+          <a:stretch/>
+        </p:blipFill>
+        <p:spPr>
+          <a:xfrm>
+            <a:off x="10478557" y="5023525"/>
+            <a:ext cx="1214996" cy="444288"/>
+          </a:xfrm>
+          <a:prstGeom prst="rect">
+            <a:avLst/>
+          </a:prstGeom>
+        </p:spPr>
+      </p:pic>
+      <p:sp>
+        <p:nvSpPr>
+          <p:cNvPr id="22" name="TextBox 21">
+            <a:extLst>
+              <a:ext uri="{FF2B5EF4-FFF2-40B4-BE49-F238E27FC236}">
+                <a16:creationId xmlns:a16="http://schemas.microsoft.com/office/drawing/2014/main" id="{C5F2E2B0-6AE9-174D-8796-1758F86A2676}"/>
+              </a:ext>
+            </a:extLst>
+          </p:cNvPr>
+          <p:cNvSpPr txBox="1"/>
+          <p:nvPr/>
+        </p:nvSpPr>
+        <p:spPr>
+          <a:xfrm>
+            <a:off x="10450133" y="4468105"/>
+            <a:ext cx="1327491" cy="707886"/>
+          </a:xfrm>
+          <a:prstGeom prst="rect">
+            <a:avLst/>
+          </a:prstGeom>
+          <a:noFill/>
+        </p:spPr>
+        <p:txBody>
+          <a:bodyPr wrap="square" rtlCol="0">
+            <a:spAutoFit/>
+          </a:bodyPr>
+          <a:lstStyle/>
+          <a:p>
+            <a:r>
+              <a:rPr lang="en-US" sz="2000" dirty="0">
+                <a:solidFill>
+                  <a:srgbClr val="000000"/>
+                </a:solidFill>
+                <a:cs typeface="Arial"/>
+              </a:rPr>
+              <a:t>“Black and gold mug.”</a:t>
+            </a:r>
+          </a:p>
+        </p:txBody>
+      </p:sp>
+      <p:sp>
+        <p:nvSpPr>
+          <p:cNvPr id="24" name="TextBox 23">
+            <a:extLst>
+              <a:ext uri="{FF2B5EF4-FFF2-40B4-BE49-F238E27FC236}">
+                <a16:creationId xmlns:a16="http://schemas.microsoft.com/office/drawing/2014/main" id="{EB645C21-2D85-7044-854A-6CD1592F02BF}"/>
+              </a:ext>
+            </a:extLst>
+          </p:cNvPr>
+          <p:cNvSpPr txBox="1"/>
+          <p:nvPr/>
+        </p:nvSpPr>
+        <p:spPr>
+          <a:xfrm>
+            <a:off x="181371" y="4780420"/>
+            <a:ext cx="1274686" cy="400110"/>
+          </a:xfrm>
+          <a:prstGeom prst="rect">
+            <a:avLst/>
+          </a:prstGeom>
+          <a:noFill/>
+        </p:spPr>
+        <p:txBody>
+          <a:bodyPr rot="0" spcFirstLastPara="0" vertOverflow="overflow" horzOverflow="overflow" vert="horz" wrap="square" lIns="91440" tIns="45720" rIns="91440" bIns="45720" numCol="1" spcCol="0" rtlCol="0" fromWordArt="0" anchor="t" anchorCtr="0" forceAA="0" compatLnSpc="1">
+            <a:prstTxWarp prst="textNoShape">
+              <a:avLst/>
+            </a:prstTxWarp>
+            <a:spAutoFit/>
+          </a:bodyPr>
+          <a:lstStyle/>
+          <a:p>
+            <a:r>
+              <a:rPr lang="en-US" sz="2000" dirty="0">
+                <a:cs typeface="Arial"/>
+              </a:rPr>
+              <a:t>Speech</a:t>
+            </a:r>
+            <a:endParaRPr lang="en-US" sz="2000" dirty="0">
+              <a:cs typeface="Calibri"/>
+            </a:endParaRPr>
+          </a:p>
+        </p:txBody>
+      </p:sp>
+      <p:sp>
+        <p:nvSpPr>
+          <p:cNvPr id="11" name="Rectangle: Rounded Corners 10">
+            <a:extLst>
+              <a:ext uri="{FF2B5EF4-FFF2-40B4-BE49-F238E27FC236}">
+                <a16:creationId xmlns:a16="http://schemas.microsoft.com/office/drawing/2014/main" id="{5B6E86F0-14B8-4A31-BD4E-D6146C992D25}"/>
+              </a:ext>
+            </a:extLst>
+          </p:cNvPr>
+          <p:cNvSpPr/>
+          <p:nvPr/>
+        </p:nvSpPr>
+        <p:spPr>
+          <a:xfrm>
+            <a:off x="1090322" y="1097548"/>
+            <a:ext cx="1596754" cy="890143"/>
+          </a:xfrm>
+          <a:prstGeom prst="roundRect">
+            <a:avLst/>
+          </a:prstGeom>
+          <a:solidFill>
+            <a:schemeClr val="bg2"/>
+          </a:solidFill>
+          <a:ln>
+            <a:solidFill>
+              <a:schemeClr val="accent1"/>
+            </a:solidFill>
+          </a:ln>
+        </p:spPr>
+        <p:style>
+          <a:lnRef idx="2">
+            <a:schemeClr val="accent1">
+              <a:shade val="50000"/>
+            </a:schemeClr>
+          </a:lnRef>
+          <a:fillRef idx="1">
+            <a:schemeClr val="accent1"/>
+          </a:fillRef>
+          <a:effectRef idx="0">
+            <a:schemeClr val="accent1"/>
+          </a:effectRef>
+          <a:fontRef idx="minor">
+            <a:schemeClr val="lt1"/>
+          </a:fontRef>
+        </p:style>
+        <p:txBody>
+          <a:bodyPr rtlCol="0" anchor="ctr"/>
+          <a:lstStyle/>
+          <a:p>
+            <a:pPr algn="ctr"/>
+            <a:r>
+              <a:rPr lang="en-US" sz="2400" dirty="0">
+                <a:solidFill>
+                  <a:srgbClr val="000000"/>
+                </a:solidFill>
+                <a:cs typeface="Arial"/>
+              </a:rPr>
+              <a:t>This is a red apple.</a:t>
+            </a:r>
+            <a:endParaRPr lang="en-US" sz="2400" dirty="0">
+              <a:solidFill>
+                <a:srgbClr val="000000"/>
+              </a:solidFill>
+              <a:ea typeface="+mn-lt"/>
+              <a:cs typeface="+mn-lt"/>
+            </a:endParaRPr>
+          </a:p>
+        </p:txBody>
+      </p:sp>
+      <p:sp>
+        <p:nvSpPr>
+          <p:cNvPr id="62" name="Rounded Rectangle 61">
+            <a:extLst>
+              <a:ext uri="{FF2B5EF4-FFF2-40B4-BE49-F238E27FC236}">
+                <a16:creationId xmlns:a16="http://schemas.microsoft.com/office/drawing/2014/main" id="{20FD8163-9F08-AD40-B70B-448D0BED808D}"/>
+              </a:ext>
+            </a:extLst>
+          </p:cNvPr>
+          <p:cNvSpPr/>
+          <p:nvPr/>
+        </p:nvSpPr>
+        <p:spPr>
+          <a:xfrm>
+            <a:off x="3872054" y="977528"/>
+            <a:ext cx="93143" cy="795846"/>
+          </a:xfrm>
+          <a:prstGeom prst="roundRect">
+            <a:avLst/>
+          </a:prstGeom>
+          <a:solidFill>
+            <a:schemeClr val="accent3"/>
+          </a:solidFill>
+        </p:spPr>
+        <p:style>
+          <a:lnRef idx="2">
+            <a:schemeClr val="accent1">
+              <a:shade val="50000"/>
+            </a:schemeClr>
+          </a:lnRef>
+          <a:fillRef idx="1">
+            <a:schemeClr val="accent1"/>
+          </a:fillRef>
+          <a:effectRef idx="0">
+            <a:schemeClr val="accent1"/>
+          </a:effectRef>
+          <a:fontRef idx="minor">
+            <a:schemeClr val="lt1"/>
+          </a:fontRef>
+        </p:style>
+        <p:txBody>
+          <a:bodyPr lIns="0" rIns="0" rtlCol="0" anchor="ctr"/>
+          <a:lstStyle/>
+          <a:p>
+            <a:pPr algn="ctr"/>
+            <a:endParaRPr lang="en-US" sz="1400"/>
+          </a:p>
+        </p:txBody>
+      </p:sp>
+      <p:sp>
+        <p:nvSpPr>
+          <p:cNvPr id="63" name="Rounded Rectangle 62">
+            <a:extLst>
+              <a:ext uri="{FF2B5EF4-FFF2-40B4-BE49-F238E27FC236}">
+                <a16:creationId xmlns:a16="http://schemas.microsoft.com/office/drawing/2014/main" id="{16ADDAA0-F6CD-934B-9B4E-B7CB888C2CCA}"/>
+              </a:ext>
+            </a:extLst>
+          </p:cNvPr>
+          <p:cNvSpPr/>
+          <p:nvPr/>
+        </p:nvSpPr>
+        <p:spPr>
+          <a:xfrm>
+            <a:off x="3868623" y="2024181"/>
+            <a:ext cx="93143" cy="795845"/>
+          </a:xfrm>
+          <a:prstGeom prst="roundRect">
+            <a:avLst/>
+          </a:prstGeom>
+          <a:solidFill>
+            <a:schemeClr val="accent3"/>
+          </a:solidFill>
+        </p:spPr>
+        <p:style>
+          <a:lnRef idx="2">
+            <a:schemeClr val="accent1">
+              <a:shade val="50000"/>
+            </a:schemeClr>
+          </a:lnRef>
+          <a:fillRef idx="1">
+            <a:schemeClr val="accent1"/>
+          </a:fillRef>
+          <a:effectRef idx="0">
+            <a:schemeClr val="accent1"/>
+          </a:effectRef>
+          <a:fontRef idx="minor">
+            <a:schemeClr val="lt1"/>
+          </a:fontRef>
+        </p:style>
+        <p:txBody>
+          <a:bodyPr lIns="0" rIns="0" rtlCol="0" anchor="ctr"/>
+          <a:lstStyle/>
+          <a:p>
+            <a:pPr algn="ctr"/>
+            <a:endParaRPr lang="en-US" sz="1400"/>
+          </a:p>
+        </p:txBody>
+      </p:sp>
+      <p:sp>
+        <p:nvSpPr>
+          <p:cNvPr id="67" name="Rounded Rectangle 66">
+            <a:extLst>
+              <a:ext uri="{FF2B5EF4-FFF2-40B4-BE49-F238E27FC236}">
+                <a16:creationId xmlns:a16="http://schemas.microsoft.com/office/drawing/2014/main" id="{B9DFB07C-98F0-9446-AD1E-5228B89ACCD9}"/>
+              </a:ext>
+            </a:extLst>
+          </p:cNvPr>
+          <p:cNvSpPr/>
+          <p:nvPr/>
+        </p:nvSpPr>
+        <p:spPr>
+          <a:xfrm>
+            <a:off x="3828890" y="3278906"/>
+            <a:ext cx="93143" cy="795845"/>
+          </a:xfrm>
+          <a:prstGeom prst="roundRect">
+            <a:avLst/>
+          </a:prstGeom>
+          <a:solidFill>
+            <a:schemeClr val="accent3"/>
+          </a:solidFill>
+        </p:spPr>
+        <p:style>
+          <a:lnRef idx="2">
+            <a:schemeClr val="accent1">
+              <a:shade val="50000"/>
+            </a:schemeClr>
+          </a:lnRef>
+          <a:fillRef idx="1">
+            <a:schemeClr val="accent1"/>
+          </a:fillRef>
+          <a:effectRef idx="0">
+            <a:schemeClr val="accent1"/>
+          </a:effectRef>
+          <a:fontRef idx="minor">
+            <a:schemeClr val="lt1"/>
+          </a:fontRef>
+        </p:style>
+        <p:txBody>
+          <a:bodyPr lIns="0" rIns="0" rtlCol="0" anchor="ctr"/>
+          <a:lstStyle/>
+          <a:p>
+            <a:pPr algn="ctr"/>
+            <a:endParaRPr lang="en-US" sz="1400" dirty="0"/>
+          </a:p>
+        </p:txBody>
+      </p:sp>
+      <p:sp>
+        <p:nvSpPr>
+          <p:cNvPr id="70" name="Rounded Rectangle 69">
+            <a:extLst>
+              <a:ext uri="{FF2B5EF4-FFF2-40B4-BE49-F238E27FC236}">
+                <a16:creationId xmlns:a16="http://schemas.microsoft.com/office/drawing/2014/main" id="{920B9EDD-8CB6-3949-AF54-2676FED171E6}"/>
+              </a:ext>
+            </a:extLst>
+          </p:cNvPr>
+          <p:cNvSpPr/>
+          <p:nvPr/>
+        </p:nvSpPr>
+        <p:spPr>
+          <a:xfrm>
+            <a:off x="3868170" y="4468105"/>
+            <a:ext cx="93143" cy="795845"/>
+          </a:xfrm>
+          <a:prstGeom prst="roundRect">
+            <a:avLst/>
+          </a:prstGeom>
+          <a:solidFill>
+            <a:schemeClr val="accent3"/>
+          </a:solidFill>
+        </p:spPr>
+        <p:style>
+          <a:lnRef idx="2">
+            <a:schemeClr val="accent1">
+              <a:shade val="50000"/>
+            </a:schemeClr>
+          </a:lnRef>
+          <a:fillRef idx="1">
+            <a:schemeClr val="accent1"/>
+          </a:fillRef>
+          <a:effectRef idx="0">
+            <a:schemeClr val="accent1"/>
+          </a:effectRef>
+          <a:fontRef idx="minor">
+            <a:schemeClr val="lt1"/>
+          </a:fontRef>
+        </p:style>
+        <p:txBody>
+          <a:bodyPr lIns="0" rIns="0" rtlCol="0" anchor="ctr"/>
+          <a:lstStyle/>
+          <a:p>
+            <a:pPr algn="ctr"/>
+            <a:endParaRPr lang="en-US" sz="1400"/>
+          </a:p>
+        </p:txBody>
+      </p:sp>
+      <p:sp>
+        <p:nvSpPr>
+          <p:cNvPr id="81" name="Rounded Rectangle 80">
+            <a:extLst>
+              <a:ext uri="{FF2B5EF4-FFF2-40B4-BE49-F238E27FC236}">
+                <a16:creationId xmlns:a16="http://schemas.microsoft.com/office/drawing/2014/main" id="{6146DB06-0146-3246-AAED-F525B2E5E290}"/>
+              </a:ext>
+            </a:extLst>
+          </p:cNvPr>
+          <p:cNvSpPr/>
+          <p:nvPr/>
+        </p:nvSpPr>
+        <p:spPr>
+          <a:xfrm>
+            <a:off x="9127475" y="1002680"/>
+            <a:ext cx="93143" cy="795845"/>
+          </a:xfrm>
+          <a:prstGeom prst="roundRect">
+            <a:avLst/>
+          </a:prstGeom>
+          <a:solidFill>
+            <a:schemeClr val="accent3"/>
+          </a:solidFill>
+        </p:spPr>
+        <p:style>
+          <a:lnRef idx="2">
+            <a:schemeClr val="accent1">
+              <a:shade val="50000"/>
+            </a:schemeClr>
+          </a:lnRef>
+          <a:fillRef idx="1">
+            <a:schemeClr val="accent1"/>
+          </a:fillRef>
+          <a:effectRef idx="0">
+            <a:schemeClr val="accent1"/>
+          </a:effectRef>
+          <a:fontRef idx="minor">
+            <a:schemeClr val="lt1"/>
+          </a:fontRef>
+        </p:style>
+        <p:txBody>
+          <a:bodyPr lIns="0" rIns="0" rtlCol="0" anchor="ctr"/>
+          <a:lstStyle/>
+          <a:p>
+            <a:pPr algn="ctr"/>
+            <a:endParaRPr lang="en-US" sz="1400" dirty="0"/>
+          </a:p>
+        </p:txBody>
+      </p:sp>
+      <p:sp>
+        <p:nvSpPr>
+          <p:cNvPr id="83" name="Rounded Rectangle 82">
+            <a:extLst>
+              <a:ext uri="{FF2B5EF4-FFF2-40B4-BE49-F238E27FC236}">
+                <a16:creationId xmlns:a16="http://schemas.microsoft.com/office/drawing/2014/main" id="{098DE0A2-6AEF-AF46-B622-8405BA7762DF}"/>
+              </a:ext>
+            </a:extLst>
+          </p:cNvPr>
+          <p:cNvSpPr/>
+          <p:nvPr/>
+        </p:nvSpPr>
+        <p:spPr>
+          <a:xfrm>
+            <a:off x="9121790" y="2078702"/>
+            <a:ext cx="93143" cy="795845"/>
+          </a:xfrm>
+          <a:prstGeom prst="roundRect">
+            <a:avLst/>
+          </a:prstGeom>
+          <a:solidFill>
+            <a:schemeClr val="accent3"/>
+          </a:solidFill>
+        </p:spPr>
+        <p:style>
+          <a:lnRef idx="2">
+            <a:schemeClr val="accent1">
+              <a:shade val="50000"/>
+            </a:schemeClr>
+          </a:lnRef>
+          <a:fillRef idx="1">
+            <a:schemeClr val="accent1"/>
+          </a:fillRef>
+          <a:effectRef idx="0">
+            <a:schemeClr val="accent1"/>
+          </a:effectRef>
+          <a:fontRef idx="minor">
+            <a:schemeClr val="lt1"/>
+          </a:fontRef>
+        </p:style>
+        <p:txBody>
+          <a:bodyPr lIns="0" rIns="0" rtlCol="0" anchor="ctr"/>
+          <a:lstStyle/>
+          <a:p>
+            <a:pPr algn="ctr"/>
+            <a:endParaRPr lang="en-US" sz="1400" dirty="0"/>
+          </a:p>
+        </p:txBody>
+      </p:sp>
+      <p:sp>
+        <p:nvSpPr>
+          <p:cNvPr id="84" name="Rounded Rectangle 83">
+            <a:extLst>
+              <a:ext uri="{FF2B5EF4-FFF2-40B4-BE49-F238E27FC236}">
+                <a16:creationId xmlns:a16="http://schemas.microsoft.com/office/drawing/2014/main" id="{D0706DB5-8B45-264B-92BC-6B905F93DBB4}"/>
+              </a:ext>
+            </a:extLst>
+          </p:cNvPr>
+          <p:cNvSpPr/>
+          <p:nvPr/>
+        </p:nvSpPr>
+        <p:spPr>
+          <a:xfrm>
+            <a:off x="9123789" y="3274911"/>
+            <a:ext cx="93143" cy="795845"/>
+          </a:xfrm>
+          <a:prstGeom prst="roundRect">
+            <a:avLst/>
+          </a:prstGeom>
+          <a:solidFill>
+            <a:schemeClr val="accent3"/>
+          </a:solidFill>
+        </p:spPr>
+        <p:style>
+          <a:lnRef idx="2">
+            <a:schemeClr val="accent1">
+              <a:shade val="50000"/>
+            </a:schemeClr>
+          </a:lnRef>
+          <a:fillRef idx="1">
+            <a:schemeClr val="accent1"/>
+          </a:fillRef>
+          <a:effectRef idx="0">
+            <a:schemeClr val="accent1"/>
+          </a:effectRef>
+          <a:fontRef idx="minor">
+            <a:schemeClr val="lt1"/>
+          </a:fontRef>
+        </p:style>
+        <p:txBody>
+          <a:bodyPr lIns="0" rIns="0" rtlCol="0" anchor="ctr"/>
+          <a:lstStyle/>
+          <a:p>
+            <a:pPr algn="ctr"/>
+            <a:endParaRPr lang="en-US" sz="1400" dirty="0"/>
+          </a:p>
+        </p:txBody>
+      </p:sp>
+      <p:sp>
+        <p:nvSpPr>
+          <p:cNvPr id="85" name="Rounded Rectangle 84">
+            <a:extLst>
+              <a:ext uri="{FF2B5EF4-FFF2-40B4-BE49-F238E27FC236}">
+                <a16:creationId xmlns:a16="http://schemas.microsoft.com/office/drawing/2014/main" id="{87A962E7-6111-794C-A96D-530AEFFA70BC}"/>
+              </a:ext>
+            </a:extLst>
+          </p:cNvPr>
+          <p:cNvSpPr/>
+          <p:nvPr/>
+        </p:nvSpPr>
+        <p:spPr>
+          <a:xfrm>
+            <a:off x="9135005" y="4505635"/>
+            <a:ext cx="93143" cy="795845"/>
+          </a:xfrm>
+          <a:prstGeom prst="roundRect">
+            <a:avLst/>
+          </a:prstGeom>
+          <a:solidFill>
+            <a:schemeClr val="accent3"/>
+          </a:solidFill>
+        </p:spPr>
+        <p:style>
+          <a:lnRef idx="2">
+            <a:schemeClr val="accent1">
+              <a:shade val="50000"/>
+            </a:schemeClr>
+          </a:lnRef>
+          <a:fillRef idx="1">
+            <a:schemeClr val="accent1"/>
+          </a:fillRef>
+          <a:effectRef idx="0">
+            <a:schemeClr val="accent1"/>
+          </a:effectRef>
+          <a:fontRef idx="minor">
+            <a:schemeClr val="lt1"/>
+          </a:fontRef>
+        </p:style>
+        <p:txBody>
+          <a:bodyPr lIns="0" rIns="0" rtlCol="0" anchor="ctr"/>
+          <a:lstStyle/>
+          <a:p>
+            <a:pPr algn="ctr"/>
+            <a:endParaRPr lang="en-US" sz="1400" dirty="0"/>
+          </a:p>
+        </p:txBody>
+      </p:sp>
+      <p:sp>
+        <p:nvSpPr>
+          <p:cNvPr id="95" name="Rounded Rectangle 94">
+            <a:extLst>
+              <a:ext uri="{FF2B5EF4-FFF2-40B4-BE49-F238E27FC236}">
+                <a16:creationId xmlns:a16="http://schemas.microsoft.com/office/drawing/2014/main" id="{89A72017-0768-B842-8402-B05AA5771941}"/>
+              </a:ext>
+            </a:extLst>
+          </p:cNvPr>
+          <p:cNvSpPr/>
+          <p:nvPr/>
+        </p:nvSpPr>
+        <p:spPr>
+          <a:xfrm>
+            <a:off x="7799843" y="997803"/>
+            <a:ext cx="93143" cy="795845"/>
+          </a:xfrm>
+          <a:prstGeom prst="roundRect">
+            <a:avLst/>
+          </a:prstGeom>
+          <a:solidFill>
+            <a:schemeClr val="accent2"/>
+          </a:solidFill>
+        </p:spPr>
+        <p:style>
+          <a:lnRef idx="2">
+            <a:schemeClr val="accent1">
+              <a:shade val="50000"/>
+            </a:schemeClr>
+          </a:lnRef>
+          <a:fillRef idx="1">
+            <a:schemeClr val="accent1"/>
+          </a:fillRef>
+          <a:effectRef idx="0">
+            <a:schemeClr val="accent1"/>
+          </a:effectRef>
+          <a:fontRef idx="minor">
+            <a:schemeClr val="lt1"/>
+          </a:fontRef>
+        </p:style>
+        <p:txBody>
+          <a:bodyPr lIns="0" rIns="0" rtlCol="0" anchor="ctr"/>
+          <a:lstStyle/>
+          <a:p>
+            <a:pPr algn="ctr"/>
+            <a:endParaRPr lang="en-US" sz="1400" dirty="0"/>
+          </a:p>
+        </p:txBody>
+      </p:sp>
+      <p:sp>
+        <p:nvSpPr>
+          <p:cNvPr id="98" name="Rounded Rectangle 97">
+            <a:extLst>
+              <a:ext uri="{FF2B5EF4-FFF2-40B4-BE49-F238E27FC236}">
+                <a16:creationId xmlns:a16="http://schemas.microsoft.com/office/drawing/2014/main" id="{27031A07-7449-4140-BA3F-0F73181F6229}"/>
+              </a:ext>
+            </a:extLst>
+          </p:cNvPr>
+          <p:cNvSpPr/>
+          <p:nvPr/>
+        </p:nvSpPr>
+        <p:spPr>
+          <a:xfrm>
+            <a:off x="7799843" y="2068533"/>
+            <a:ext cx="93143" cy="795845"/>
+          </a:xfrm>
+          <a:prstGeom prst="roundRect">
+            <a:avLst/>
+          </a:prstGeom>
+          <a:solidFill>
+            <a:schemeClr val="accent2"/>
+          </a:solidFill>
+        </p:spPr>
+        <p:style>
+          <a:lnRef idx="2">
+            <a:schemeClr val="accent1">
+              <a:shade val="50000"/>
+            </a:schemeClr>
+          </a:lnRef>
+          <a:fillRef idx="1">
+            <a:schemeClr val="accent1"/>
+          </a:fillRef>
+          <a:effectRef idx="0">
+            <a:schemeClr val="accent1"/>
+          </a:effectRef>
+          <a:fontRef idx="minor">
+            <a:schemeClr val="lt1"/>
+          </a:fontRef>
+        </p:style>
+        <p:txBody>
+          <a:bodyPr lIns="0" rIns="0" rtlCol="0" anchor="ctr"/>
+          <a:lstStyle/>
+          <a:p>
+            <a:pPr algn="ctr"/>
+            <a:endParaRPr lang="en-US" sz="1400" dirty="0"/>
+          </a:p>
+        </p:txBody>
+      </p:sp>
+      <p:sp>
+        <p:nvSpPr>
+          <p:cNvPr id="100" name="Rounded Rectangle 99">
+            <a:extLst>
+              <a:ext uri="{FF2B5EF4-FFF2-40B4-BE49-F238E27FC236}">
+                <a16:creationId xmlns:a16="http://schemas.microsoft.com/office/drawing/2014/main" id="{055E26F7-A9E5-E34E-ABA0-CA6624A74BA0}"/>
+              </a:ext>
+            </a:extLst>
+          </p:cNvPr>
+          <p:cNvSpPr/>
+          <p:nvPr/>
+        </p:nvSpPr>
+        <p:spPr>
+          <a:xfrm>
+            <a:off x="7801842" y="3274911"/>
+            <a:ext cx="93143" cy="795845"/>
+          </a:xfrm>
+          <a:prstGeom prst="roundRect">
+            <a:avLst/>
+          </a:prstGeom>
+          <a:solidFill>
+            <a:schemeClr val="accent2"/>
+          </a:solidFill>
+        </p:spPr>
+        <p:style>
+          <a:lnRef idx="2">
+            <a:schemeClr val="accent1">
+              <a:shade val="50000"/>
+            </a:schemeClr>
+          </a:lnRef>
+          <a:fillRef idx="1">
+            <a:schemeClr val="accent1"/>
+          </a:fillRef>
+          <a:effectRef idx="0">
+            <a:schemeClr val="accent1"/>
+          </a:effectRef>
+          <a:fontRef idx="minor">
+            <a:schemeClr val="lt1"/>
+          </a:fontRef>
+        </p:style>
+        <p:txBody>
+          <a:bodyPr lIns="0" rIns="0" rtlCol="0" anchor="ctr"/>
+          <a:lstStyle/>
+          <a:p>
+            <a:pPr algn="ctr"/>
+            <a:endParaRPr lang="en-US" sz="1400" dirty="0"/>
+          </a:p>
+        </p:txBody>
+      </p:sp>
+      <p:sp>
+        <p:nvSpPr>
+          <p:cNvPr id="105" name="Rounded Rectangle 104">
+            <a:extLst>
+              <a:ext uri="{FF2B5EF4-FFF2-40B4-BE49-F238E27FC236}">
+                <a16:creationId xmlns:a16="http://schemas.microsoft.com/office/drawing/2014/main" id="{CDF3FA5E-5FE7-B945-99DD-F32DC06253E0}"/>
+              </a:ext>
+            </a:extLst>
+          </p:cNvPr>
+          <p:cNvSpPr/>
+          <p:nvPr/>
+        </p:nvSpPr>
+        <p:spPr>
+          <a:xfrm>
+            <a:off x="7817117" y="4491714"/>
+            <a:ext cx="93143" cy="795845"/>
+          </a:xfrm>
+          <a:prstGeom prst="roundRect">
+            <a:avLst/>
+          </a:prstGeom>
+          <a:solidFill>
+            <a:schemeClr val="accent2"/>
+          </a:solidFill>
+        </p:spPr>
+        <p:style>
+          <a:lnRef idx="2">
+            <a:schemeClr val="accent1">
+              <a:shade val="50000"/>
+            </a:schemeClr>
+          </a:lnRef>
+          <a:fillRef idx="1">
+            <a:schemeClr val="accent1"/>
+          </a:fillRef>
+          <a:effectRef idx="0">
+            <a:schemeClr val="accent1"/>
+          </a:effectRef>
+          <a:fontRef idx="minor">
+            <a:schemeClr val="lt1"/>
+          </a:fontRef>
+        </p:style>
+        <p:txBody>
+          <a:bodyPr lIns="0" rIns="0" rtlCol="0" anchor="ctr"/>
+          <a:lstStyle/>
+          <a:p>
+            <a:pPr algn="ctr"/>
+            <a:endParaRPr lang="en-US" sz="1400" dirty="0"/>
+          </a:p>
+        </p:txBody>
+      </p:sp>
+      <p:sp>
+        <p:nvSpPr>
+          <p:cNvPr id="111" name="Rounded Rectangle 110">
+            <a:extLst>
+              <a:ext uri="{FF2B5EF4-FFF2-40B4-BE49-F238E27FC236}">
+                <a16:creationId xmlns:a16="http://schemas.microsoft.com/office/drawing/2014/main" id="{499A130E-6EE4-B649-8B64-7A74C30751DC}"/>
+              </a:ext>
+            </a:extLst>
+          </p:cNvPr>
+          <p:cNvSpPr/>
+          <p:nvPr/>
+        </p:nvSpPr>
+        <p:spPr>
+          <a:xfrm>
+            <a:off x="5476968" y="994469"/>
+            <a:ext cx="93143" cy="795845"/>
+          </a:xfrm>
+          <a:prstGeom prst="roundRect">
+            <a:avLst/>
+          </a:prstGeom>
+          <a:solidFill>
+            <a:schemeClr val="accent6"/>
+          </a:solidFill>
+        </p:spPr>
+        <p:style>
+          <a:lnRef idx="2">
+            <a:schemeClr val="accent1">
+              <a:shade val="50000"/>
+            </a:schemeClr>
+          </a:lnRef>
+          <a:fillRef idx="1">
+            <a:schemeClr val="accent1"/>
+          </a:fillRef>
+          <a:effectRef idx="0">
+            <a:schemeClr val="accent1"/>
+          </a:effectRef>
+          <a:fontRef idx="minor">
+            <a:schemeClr val="lt1"/>
+          </a:fontRef>
+        </p:style>
+        <p:txBody>
+          <a:bodyPr lIns="0" rIns="0" rtlCol="0" anchor="ctr"/>
+          <a:lstStyle/>
+          <a:p>
+            <a:pPr algn="ctr"/>
+            <a:endParaRPr lang="en-US" sz="1400"/>
+          </a:p>
+        </p:txBody>
+      </p:sp>
+      <p:sp>
+        <p:nvSpPr>
+          <p:cNvPr id="125" name="Right Arrow 124">
+            <a:extLst>
+              <a:ext uri="{FF2B5EF4-FFF2-40B4-BE49-F238E27FC236}">
+                <a16:creationId xmlns:a16="http://schemas.microsoft.com/office/drawing/2014/main" id="{983C6A98-E69A-424F-BEA9-0A6EAD9D1E0F}"/>
+              </a:ext>
+            </a:extLst>
+          </p:cNvPr>
+          <p:cNvSpPr/>
+          <p:nvPr/>
+        </p:nvSpPr>
+        <p:spPr>
+          <a:xfrm>
+            <a:off x="2718096" y="1064525"/>
+            <a:ext cx="1134552" cy="631048"/>
+          </a:xfrm>
+          <a:prstGeom prst="rightArrow">
+            <a:avLst/>
+          </a:prstGeom>
+        </p:spPr>
+        <p:style>
+          <a:lnRef idx="2">
+            <a:schemeClr val="accent3">
+              <a:shade val="50000"/>
+            </a:schemeClr>
+          </a:lnRef>
+          <a:fillRef idx="1">
+            <a:schemeClr val="accent3"/>
+          </a:fillRef>
+          <a:effectRef idx="0">
+            <a:schemeClr val="accent3"/>
+          </a:effectRef>
+          <a:fontRef idx="minor">
+            <a:schemeClr val="lt1"/>
+          </a:fontRef>
+        </p:style>
+        <p:txBody>
+          <a:bodyPr wrap="none" lIns="0" tIns="0" rIns="0" bIns="0" rtlCol="0" anchor="ctr"/>
+          <a:lstStyle/>
+          <a:p>
+            <a:pPr algn="ctr"/>
+            <a:r>
+              <a:rPr lang="en-US" dirty="0"/>
+              <a:t>BERT</a:t>
+            </a:r>
+          </a:p>
+        </p:txBody>
+      </p:sp>
+      <p:sp>
+        <p:nvSpPr>
+          <p:cNvPr id="126" name="Right Arrow 125">
+            <a:extLst>
+              <a:ext uri="{FF2B5EF4-FFF2-40B4-BE49-F238E27FC236}">
+                <a16:creationId xmlns:a16="http://schemas.microsoft.com/office/drawing/2014/main" id="{C81F3D38-7C09-0E4C-B473-1A92C00F6EA4}"/>
+              </a:ext>
+            </a:extLst>
+          </p:cNvPr>
+          <p:cNvSpPr/>
+          <p:nvPr/>
+        </p:nvSpPr>
+        <p:spPr>
+          <a:xfrm>
+            <a:off x="2678815" y="4569529"/>
+            <a:ext cx="1167659" cy="631048"/>
+          </a:xfrm>
+          <a:prstGeom prst="rightArrow">
+            <a:avLst/>
+          </a:prstGeom>
+        </p:spPr>
+        <p:style>
+          <a:lnRef idx="2">
+            <a:schemeClr val="accent3">
+              <a:shade val="50000"/>
+            </a:schemeClr>
+          </a:lnRef>
+          <a:fillRef idx="1">
+            <a:schemeClr val="accent3"/>
+          </a:fillRef>
+          <a:effectRef idx="0">
+            <a:schemeClr val="accent3"/>
+          </a:effectRef>
+          <a:fontRef idx="minor">
+            <a:schemeClr val="lt1"/>
+          </a:fontRef>
+        </p:style>
+        <p:txBody>
+          <a:bodyPr wrap="none" lIns="0" tIns="0" rIns="0" bIns="0" rtlCol="0" anchor="ctr"/>
+          <a:lstStyle/>
+          <a:p>
+            <a:pPr algn="ctr"/>
+            <a:r>
+              <a:rPr lang="en-US" dirty="0"/>
+              <a:t>BERT</a:t>
+            </a:r>
+          </a:p>
+        </p:txBody>
+      </p:sp>
+      <p:sp>
+        <p:nvSpPr>
+          <p:cNvPr id="127" name="Right Arrow 126">
+            <a:extLst>
+              <a:ext uri="{FF2B5EF4-FFF2-40B4-BE49-F238E27FC236}">
+                <a16:creationId xmlns:a16="http://schemas.microsoft.com/office/drawing/2014/main" id="{A84D6CDB-7E5B-C947-BCC0-D46A13151DAA}"/>
+              </a:ext>
+            </a:extLst>
+          </p:cNvPr>
+          <p:cNvSpPr/>
+          <p:nvPr/>
+        </p:nvSpPr>
+        <p:spPr>
+          <a:xfrm>
+            <a:off x="2666157" y="2121556"/>
+            <a:ext cx="1189640" cy="631048"/>
+          </a:xfrm>
+          <a:prstGeom prst="rightArrow">
+            <a:avLst/>
+          </a:prstGeom>
+        </p:spPr>
+        <p:style>
+          <a:lnRef idx="2">
+            <a:schemeClr val="accent3">
+              <a:shade val="50000"/>
+            </a:schemeClr>
+          </a:lnRef>
+          <a:fillRef idx="1">
+            <a:schemeClr val="accent3"/>
+          </a:fillRef>
+          <a:effectRef idx="0">
+            <a:schemeClr val="accent3"/>
+          </a:effectRef>
+          <a:fontRef idx="minor">
+            <a:schemeClr val="lt1"/>
+          </a:fontRef>
+        </p:style>
+        <p:txBody>
+          <a:bodyPr wrap="none" lIns="0" tIns="0" rIns="0" bIns="0" rtlCol="0" anchor="ctr"/>
+          <a:lstStyle/>
+          <a:p>
+            <a:pPr algn="ctr"/>
+            <a:r>
+              <a:rPr lang="en-US" dirty="0"/>
+              <a:t>ResNet152</a:t>
+            </a:r>
+          </a:p>
+        </p:txBody>
+      </p:sp>
+      <p:sp>
+        <p:nvSpPr>
+          <p:cNvPr id="128" name="Right Arrow 127">
+            <a:extLst>
+              <a:ext uri="{FF2B5EF4-FFF2-40B4-BE49-F238E27FC236}">
+                <a16:creationId xmlns:a16="http://schemas.microsoft.com/office/drawing/2014/main" id="{7AF9B809-7826-2848-A5FB-E053AD7C5A9E}"/>
+              </a:ext>
+            </a:extLst>
+          </p:cNvPr>
+          <p:cNvSpPr/>
+          <p:nvPr/>
+        </p:nvSpPr>
+        <p:spPr>
+          <a:xfrm>
+            <a:off x="2643406" y="3367833"/>
+            <a:ext cx="1174477" cy="631048"/>
+          </a:xfrm>
+          <a:prstGeom prst="rightArrow">
+            <a:avLst/>
+          </a:prstGeom>
+        </p:spPr>
+        <p:style>
+          <a:lnRef idx="2">
+            <a:schemeClr val="accent3">
+              <a:shade val="50000"/>
+            </a:schemeClr>
+          </a:lnRef>
+          <a:fillRef idx="1">
+            <a:schemeClr val="accent3"/>
+          </a:fillRef>
+          <a:effectRef idx="0">
+            <a:schemeClr val="accent3"/>
+          </a:effectRef>
+          <a:fontRef idx="minor">
+            <a:schemeClr val="lt1"/>
+          </a:fontRef>
+        </p:style>
+        <p:txBody>
+          <a:bodyPr wrap="none" lIns="0" tIns="0" rIns="0" bIns="0" rtlCol="0" anchor="ctr"/>
+          <a:lstStyle/>
+          <a:p>
+            <a:pPr algn="ctr"/>
+            <a:r>
+              <a:rPr lang="en-US" dirty="0"/>
+              <a:t>ResNet152</a:t>
+            </a:r>
+          </a:p>
+        </p:txBody>
+      </p:sp>
+      <p:sp>
+        <p:nvSpPr>
+          <p:cNvPr id="129" name="Right Arrow 128">
+            <a:extLst>
+              <a:ext uri="{FF2B5EF4-FFF2-40B4-BE49-F238E27FC236}">
+                <a16:creationId xmlns:a16="http://schemas.microsoft.com/office/drawing/2014/main" id="{D271BA9B-F0C8-6840-AF24-27223BFA2CC9}"/>
+              </a:ext>
+            </a:extLst>
+          </p:cNvPr>
+          <p:cNvSpPr/>
+          <p:nvPr/>
+        </p:nvSpPr>
+        <p:spPr>
+          <a:xfrm flipH="1">
+            <a:off x="9232566" y="1072641"/>
+            <a:ext cx="1054023" cy="592237"/>
+          </a:xfrm>
+          <a:prstGeom prst="rightArrow">
+            <a:avLst/>
+          </a:prstGeom>
+        </p:spPr>
+        <p:style>
+          <a:lnRef idx="2">
+            <a:schemeClr val="accent3">
+              <a:shade val="50000"/>
+            </a:schemeClr>
+          </a:lnRef>
+          <a:fillRef idx="1">
+            <a:schemeClr val="accent3"/>
+          </a:fillRef>
+          <a:effectRef idx="0">
+            <a:schemeClr val="accent3"/>
+          </a:effectRef>
+          <a:fontRef idx="minor">
+            <a:schemeClr val="lt1"/>
+          </a:fontRef>
+        </p:style>
+        <p:txBody>
+          <a:bodyPr lIns="0" rIns="0" rtlCol="0" anchor="ctr"/>
+          <a:lstStyle/>
+          <a:p>
+            <a:pPr algn="ctr"/>
+            <a:r>
+              <a:rPr lang="en-US" dirty="0"/>
+              <a:t>BERT</a:t>
+            </a:r>
+          </a:p>
+        </p:txBody>
+      </p:sp>
+      <p:sp>
+        <p:nvSpPr>
+          <p:cNvPr id="131" name="Right Arrow 130">
+            <a:extLst>
+              <a:ext uri="{FF2B5EF4-FFF2-40B4-BE49-F238E27FC236}">
+                <a16:creationId xmlns:a16="http://schemas.microsoft.com/office/drawing/2014/main" id="{C7C58194-2B83-964D-B8F8-61D078304FF0}"/>
+              </a:ext>
+            </a:extLst>
+          </p:cNvPr>
+          <p:cNvSpPr/>
+          <p:nvPr/>
+        </p:nvSpPr>
+        <p:spPr>
+          <a:xfrm flipH="1">
+            <a:off x="9249838" y="4562097"/>
+            <a:ext cx="1036751" cy="592237"/>
+          </a:xfrm>
+          <a:prstGeom prst="rightArrow">
+            <a:avLst/>
+          </a:prstGeom>
+        </p:spPr>
+        <p:style>
+          <a:lnRef idx="2">
+            <a:schemeClr val="accent3">
+              <a:shade val="50000"/>
+            </a:schemeClr>
+          </a:lnRef>
+          <a:fillRef idx="1">
+            <a:schemeClr val="accent3"/>
+          </a:fillRef>
+          <a:effectRef idx="0">
+            <a:schemeClr val="accent3"/>
+          </a:effectRef>
+          <a:fontRef idx="minor">
+            <a:schemeClr val="lt1"/>
+          </a:fontRef>
+        </p:style>
+        <p:txBody>
+          <a:bodyPr lIns="0" rIns="0" rtlCol="0" anchor="ctr"/>
+          <a:lstStyle/>
+          <a:p>
+            <a:pPr algn="ctr"/>
+            <a:r>
+              <a:rPr lang="en-US" sz="2400" dirty="0"/>
+              <a:t>BERT</a:t>
+            </a:r>
+          </a:p>
+        </p:txBody>
+      </p:sp>
+      <p:sp>
+        <p:nvSpPr>
+          <p:cNvPr id="132" name="Right Arrow 131">
+            <a:extLst>
+              <a:ext uri="{FF2B5EF4-FFF2-40B4-BE49-F238E27FC236}">
+                <a16:creationId xmlns:a16="http://schemas.microsoft.com/office/drawing/2014/main" id="{6DFC6B6B-F488-0E44-8AF4-BCFF572CB93A}"/>
+              </a:ext>
+            </a:extLst>
+          </p:cNvPr>
+          <p:cNvSpPr/>
+          <p:nvPr/>
+        </p:nvSpPr>
+        <p:spPr>
+          <a:xfrm flipH="1">
+            <a:off x="9232566" y="2143789"/>
+            <a:ext cx="1158527" cy="592237"/>
+          </a:xfrm>
+          <a:prstGeom prst="rightArrow">
+            <a:avLst/>
+          </a:prstGeom>
+        </p:spPr>
+        <p:style>
+          <a:lnRef idx="2">
+            <a:schemeClr val="accent3">
+              <a:shade val="50000"/>
+            </a:schemeClr>
+          </a:lnRef>
+          <a:fillRef idx="1">
+            <a:schemeClr val="accent3"/>
+          </a:fillRef>
+          <a:effectRef idx="0">
+            <a:schemeClr val="accent3"/>
+          </a:effectRef>
+          <a:fontRef idx="minor">
+            <a:schemeClr val="lt1"/>
+          </a:fontRef>
+        </p:style>
+        <p:txBody>
+          <a:bodyPr wrap="none" lIns="0" tIns="0" rIns="0" bIns="0" rtlCol="0" anchor="ctr"/>
+          <a:lstStyle/>
+          <a:p>
+            <a:pPr algn="ctr"/>
+            <a:r>
+              <a:rPr lang="en-US" dirty="0"/>
+              <a:t>ResNet152</a:t>
+            </a:r>
+          </a:p>
+        </p:txBody>
+      </p:sp>
+      <p:sp>
+        <p:nvSpPr>
+          <p:cNvPr id="133" name="Right Arrow 132">
+            <a:extLst>
+              <a:ext uri="{FF2B5EF4-FFF2-40B4-BE49-F238E27FC236}">
+                <a16:creationId xmlns:a16="http://schemas.microsoft.com/office/drawing/2014/main" id="{4BD7AEA2-72DB-AD4F-9814-33CFFB670537}"/>
+              </a:ext>
+            </a:extLst>
+          </p:cNvPr>
+          <p:cNvSpPr/>
+          <p:nvPr/>
+        </p:nvSpPr>
+        <p:spPr>
+          <a:xfrm flipH="1">
+            <a:off x="9238623" y="3338993"/>
+            <a:ext cx="1129617" cy="592237"/>
+          </a:xfrm>
+          <a:prstGeom prst="rightArrow">
+            <a:avLst/>
+          </a:prstGeom>
+        </p:spPr>
+        <p:style>
+          <a:lnRef idx="2">
+            <a:schemeClr val="accent3">
+              <a:shade val="50000"/>
+            </a:schemeClr>
+          </a:lnRef>
+          <a:fillRef idx="1">
+            <a:schemeClr val="accent3"/>
+          </a:fillRef>
+          <a:effectRef idx="0">
+            <a:schemeClr val="accent3"/>
+          </a:effectRef>
+          <a:fontRef idx="minor">
+            <a:schemeClr val="lt1"/>
+          </a:fontRef>
+        </p:style>
+        <p:txBody>
+          <a:bodyPr wrap="none" lIns="0" tIns="0" rIns="0" bIns="0" rtlCol="0" anchor="ctr"/>
+          <a:lstStyle/>
+          <a:p>
+            <a:pPr algn="ctr"/>
+            <a:r>
+              <a:rPr lang="en-US" dirty="0"/>
+              <a:t>ResNet152</a:t>
+            </a:r>
+          </a:p>
+        </p:txBody>
+      </p:sp>
+      <p:sp>
+        <p:nvSpPr>
+          <p:cNvPr id="134" name="Right Arrow 133">
+            <a:extLst>
+              <a:ext uri="{FF2B5EF4-FFF2-40B4-BE49-F238E27FC236}">
+                <a16:creationId xmlns:a16="http://schemas.microsoft.com/office/drawing/2014/main" id="{E24EF4BD-FDC5-174A-B859-EA203AB53C64}"/>
+              </a:ext>
+            </a:extLst>
+          </p:cNvPr>
+          <p:cNvSpPr/>
+          <p:nvPr/>
+        </p:nvSpPr>
+        <p:spPr>
+          <a:xfrm flipH="1">
+            <a:off x="7889538" y="1068950"/>
+            <a:ext cx="1188022" cy="626623"/>
+          </a:xfrm>
+          <a:prstGeom prst="rightArrow">
+            <a:avLst/>
+          </a:prstGeom>
+          <a:solidFill>
+            <a:srgbClr val="090008"/>
+          </a:solidFill>
+          <a:ln>
+            <a:noFill/>
+          </a:ln>
+        </p:spPr>
+        <p:style>
+          <a:lnRef idx="2">
+            <a:schemeClr val="accent3">
+              <a:shade val="50000"/>
+            </a:schemeClr>
+          </a:lnRef>
+          <a:fillRef idx="1">
+            <a:schemeClr val="accent3"/>
+          </a:fillRef>
+          <a:effectRef idx="0">
+            <a:schemeClr val="accent3"/>
+          </a:effectRef>
+          <a:fontRef idx="minor">
+            <a:schemeClr val="lt1"/>
+          </a:fontRef>
+        </p:style>
+        <p:txBody>
+          <a:bodyPr wrap="none" lIns="0" tIns="0" rIns="0" bIns="0" rtlCol="0" anchor="ctr"/>
+          <a:lstStyle/>
+          <a:p>
+            <a:pPr algn="ctr"/>
+            <a:r>
+              <a:rPr lang="en-US" dirty="0"/>
+              <a:t>3 FC layers</a:t>
+            </a:r>
+          </a:p>
+        </p:txBody>
+      </p:sp>
+      <p:sp>
+        <p:nvSpPr>
+          <p:cNvPr id="136" name="Right Arrow 135">
+            <a:extLst>
+              <a:ext uri="{FF2B5EF4-FFF2-40B4-BE49-F238E27FC236}">
+                <a16:creationId xmlns:a16="http://schemas.microsoft.com/office/drawing/2014/main" id="{34DBA010-2AB8-1147-80DA-86C63767BC24}"/>
+              </a:ext>
+            </a:extLst>
+          </p:cNvPr>
+          <p:cNvSpPr/>
+          <p:nvPr/>
+        </p:nvSpPr>
+        <p:spPr>
+          <a:xfrm flipH="1">
+            <a:off x="7909793" y="2139680"/>
+            <a:ext cx="1188022" cy="626623"/>
+          </a:xfrm>
+          <a:prstGeom prst="rightArrow">
+            <a:avLst/>
+          </a:prstGeom>
+          <a:solidFill>
+            <a:srgbClr val="090008"/>
+          </a:solidFill>
+          <a:ln>
+            <a:noFill/>
+          </a:ln>
+        </p:spPr>
+        <p:style>
+          <a:lnRef idx="2">
+            <a:schemeClr val="accent3">
+              <a:shade val="50000"/>
+            </a:schemeClr>
+          </a:lnRef>
+          <a:fillRef idx="1">
+            <a:schemeClr val="accent3"/>
+          </a:fillRef>
+          <a:effectRef idx="0">
+            <a:schemeClr val="accent3"/>
+          </a:effectRef>
+          <a:fontRef idx="minor">
+            <a:schemeClr val="lt1"/>
+          </a:fontRef>
+        </p:style>
+        <p:txBody>
+          <a:bodyPr wrap="none" lIns="0" tIns="0" rIns="0" bIns="0" rtlCol="0" anchor="ctr"/>
+          <a:lstStyle/>
+          <a:p>
+            <a:pPr algn="ctr"/>
+            <a:r>
+              <a:rPr lang="en-US" dirty="0"/>
+              <a:t>3 FC layers</a:t>
+            </a:r>
+          </a:p>
+        </p:txBody>
+      </p:sp>
+      <p:sp>
+        <p:nvSpPr>
+          <p:cNvPr id="137" name="Right Arrow 136">
+            <a:extLst>
+              <a:ext uri="{FF2B5EF4-FFF2-40B4-BE49-F238E27FC236}">
+                <a16:creationId xmlns:a16="http://schemas.microsoft.com/office/drawing/2014/main" id="{C72E9B01-1112-3845-B29D-95D660513C4D}"/>
+              </a:ext>
+            </a:extLst>
+          </p:cNvPr>
+          <p:cNvSpPr/>
+          <p:nvPr/>
+        </p:nvSpPr>
+        <p:spPr>
+          <a:xfrm flipH="1">
+            <a:off x="7889226" y="4568158"/>
+            <a:ext cx="1188022" cy="626623"/>
+          </a:xfrm>
+          <a:prstGeom prst="rightArrow">
+            <a:avLst/>
+          </a:prstGeom>
+          <a:solidFill>
+            <a:srgbClr val="090008"/>
+          </a:solidFill>
+          <a:ln>
+            <a:noFill/>
+          </a:ln>
+        </p:spPr>
+        <p:style>
+          <a:lnRef idx="2">
+            <a:schemeClr val="accent3">
+              <a:shade val="50000"/>
+            </a:schemeClr>
+          </a:lnRef>
+          <a:fillRef idx="1">
+            <a:schemeClr val="accent3"/>
+          </a:fillRef>
+          <a:effectRef idx="0">
+            <a:schemeClr val="accent3"/>
+          </a:effectRef>
+          <a:fontRef idx="minor">
+            <a:schemeClr val="lt1"/>
+          </a:fontRef>
+        </p:style>
+        <p:txBody>
+          <a:bodyPr wrap="none" lIns="0" tIns="0" rIns="0" bIns="0" rtlCol="0" anchor="ctr"/>
+          <a:lstStyle/>
+          <a:p>
+            <a:pPr algn="ctr"/>
+            <a:r>
+              <a:rPr lang="en-US" dirty="0"/>
+              <a:t>3 FC layers</a:t>
+            </a:r>
+          </a:p>
+        </p:txBody>
+      </p:sp>
+      <p:sp>
+        <p:nvSpPr>
+          <p:cNvPr id="138" name="Right Arrow 137">
+            <a:extLst>
+              <a:ext uri="{FF2B5EF4-FFF2-40B4-BE49-F238E27FC236}">
+                <a16:creationId xmlns:a16="http://schemas.microsoft.com/office/drawing/2014/main" id="{5C528650-7230-8D40-A352-C52974B5F328}"/>
+              </a:ext>
+            </a:extLst>
+          </p:cNvPr>
+          <p:cNvSpPr/>
+          <p:nvPr/>
+        </p:nvSpPr>
+        <p:spPr>
+          <a:xfrm flipH="1">
+            <a:off x="7896546" y="3345055"/>
+            <a:ext cx="1188022" cy="626623"/>
+          </a:xfrm>
+          <a:prstGeom prst="rightArrow">
+            <a:avLst/>
+          </a:prstGeom>
+          <a:solidFill>
+            <a:srgbClr val="090008"/>
+          </a:solidFill>
+          <a:ln>
+            <a:noFill/>
+          </a:ln>
+        </p:spPr>
+        <p:style>
+          <a:lnRef idx="2">
+            <a:schemeClr val="accent3">
+              <a:shade val="50000"/>
+            </a:schemeClr>
+          </a:lnRef>
+          <a:fillRef idx="1">
+            <a:schemeClr val="accent3"/>
+          </a:fillRef>
+          <a:effectRef idx="0">
+            <a:schemeClr val="accent3"/>
+          </a:effectRef>
+          <a:fontRef idx="minor">
+            <a:schemeClr val="lt1"/>
+          </a:fontRef>
+        </p:style>
+        <p:txBody>
+          <a:bodyPr wrap="none" lIns="0" tIns="0" rIns="0" bIns="0" rtlCol="0" anchor="ctr"/>
+          <a:lstStyle/>
+          <a:p>
+            <a:pPr algn="ctr"/>
+            <a:r>
+              <a:rPr lang="en-US" dirty="0"/>
+              <a:t>3 FC layers</a:t>
+            </a:r>
+          </a:p>
+        </p:txBody>
+      </p:sp>
+      <p:sp>
+        <p:nvSpPr>
+          <p:cNvPr id="139" name="Right Arrow 138">
+            <a:extLst>
+              <a:ext uri="{FF2B5EF4-FFF2-40B4-BE49-F238E27FC236}">
+                <a16:creationId xmlns:a16="http://schemas.microsoft.com/office/drawing/2014/main" id="{7EAE2755-FBE1-0246-BA0C-38E5A9253CF6}"/>
+              </a:ext>
+            </a:extLst>
+          </p:cNvPr>
+          <p:cNvSpPr/>
+          <p:nvPr/>
+        </p:nvSpPr>
+        <p:spPr>
+          <a:xfrm>
+            <a:off x="3997871" y="1018909"/>
+            <a:ext cx="1144752" cy="691978"/>
+          </a:xfrm>
+          <a:prstGeom prst="rightArrow">
+            <a:avLst/>
+          </a:prstGeom>
+          <a:solidFill>
+            <a:srgbClr val="090008"/>
+          </a:solidFill>
+          <a:ln>
+            <a:noFill/>
+          </a:ln>
+        </p:spPr>
+        <p:style>
+          <a:lnRef idx="2">
+            <a:schemeClr val="accent3">
+              <a:shade val="50000"/>
+            </a:schemeClr>
+          </a:lnRef>
+          <a:fillRef idx="1">
+            <a:schemeClr val="accent3"/>
+          </a:fillRef>
+          <a:effectRef idx="0">
+            <a:schemeClr val="accent3"/>
+          </a:effectRef>
+          <a:fontRef idx="minor">
+            <a:schemeClr val="lt1"/>
+          </a:fontRef>
+        </p:style>
+        <p:txBody>
+          <a:bodyPr wrap="none" lIns="0" tIns="0" rIns="0" bIns="0" rtlCol="0" anchor="ctr"/>
+          <a:lstStyle/>
+          <a:p>
+            <a:pPr algn="ctr"/>
+            <a:r>
+              <a:rPr lang="en-US" dirty="0"/>
+              <a:t> 3 FC layers</a:t>
+            </a:r>
+          </a:p>
+        </p:txBody>
+      </p:sp>
+      <p:sp>
+        <p:nvSpPr>
+          <p:cNvPr id="140" name="Rounded Rectangle 139">
+            <a:extLst>
+              <a:ext uri="{FF2B5EF4-FFF2-40B4-BE49-F238E27FC236}">
+                <a16:creationId xmlns:a16="http://schemas.microsoft.com/office/drawing/2014/main" id="{81E41DF6-FFBC-C249-B122-756D67805B85}"/>
+              </a:ext>
+            </a:extLst>
+          </p:cNvPr>
+          <p:cNvSpPr/>
+          <p:nvPr/>
+        </p:nvSpPr>
+        <p:spPr>
+          <a:xfrm>
+            <a:off x="5476968" y="2052271"/>
+            <a:ext cx="93143" cy="795845"/>
+          </a:xfrm>
+          <a:prstGeom prst="roundRect">
+            <a:avLst/>
+          </a:prstGeom>
+          <a:solidFill>
+            <a:schemeClr val="accent6"/>
+          </a:solidFill>
+        </p:spPr>
+        <p:style>
+          <a:lnRef idx="2">
+            <a:schemeClr val="accent1">
+              <a:shade val="50000"/>
+            </a:schemeClr>
+          </a:lnRef>
+          <a:fillRef idx="1">
+            <a:schemeClr val="accent1"/>
+          </a:fillRef>
+          <a:effectRef idx="0">
+            <a:schemeClr val="accent1"/>
+          </a:effectRef>
+          <a:fontRef idx="minor">
+            <a:schemeClr val="lt1"/>
+          </a:fontRef>
+        </p:style>
+        <p:txBody>
+          <a:bodyPr lIns="0" rIns="0" rtlCol="0" anchor="ctr"/>
+          <a:lstStyle/>
+          <a:p>
+            <a:pPr algn="ctr"/>
+            <a:endParaRPr lang="en-US" sz="1400" dirty="0"/>
+          </a:p>
+        </p:txBody>
+      </p:sp>
+      <p:sp>
+        <p:nvSpPr>
+          <p:cNvPr id="141" name="Right Arrow 140">
+            <a:extLst>
+              <a:ext uri="{FF2B5EF4-FFF2-40B4-BE49-F238E27FC236}">
+                <a16:creationId xmlns:a16="http://schemas.microsoft.com/office/drawing/2014/main" id="{9C0614E6-07A4-8349-9461-D78E9077BBD4}"/>
+              </a:ext>
+            </a:extLst>
+          </p:cNvPr>
+          <p:cNvSpPr/>
+          <p:nvPr/>
+        </p:nvSpPr>
+        <p:spPr>
+          <a:xfrm>
+            <a:off x="3997871" y="2076710"/>
+            <a:ext cx="1144752" cy="691978"/>
+          </a:xfrm>
+          <a:prstGeom prst="rightArrow">
+            <a:avLst/>
+          </a:prstGeom>
+          <a:solidFill>
+            <a:srgbClr val="090008"/>
+          </a:solidFill>
+          <a:ln>
+            <a:noFill/>
+          </a:ln>
+        </p:spPr>
+        <p:style>
+          <a:lnRef idx="2">
+            <a:schemeClr val="accent3">
+              <a:shade val="50000"/>
+            </a:schemeClr>
+          </a:lnRef>
+          <a:fillRef idx="1">
+            <a:schemeClr val="accent3"/>
+          </a:fillRef>
+          <a:effectRef idx="0">
+            <a:schemeClr val="accent3"/>
+          </a:effectRef>
+          <a:fontRef idx="minor">
+            <a:schemeClr val="lt1"/>
+          </a:fontRef>
+        </p:style>
+        <p:txBody>
+          <a:bodyPr wrap="none" lIns="0" tIns="0" rIns="0" bIns="0" rtlCol="0" anchor="ctr"/>
+          <a:lstStyle/>
+          <a:p>
+            <a:pPr algn="ctr"/>
+            <a:r>
+              <a:rPr lang="en-US" dirty="0"/>
+              <a:t> 3 FC layers</a:t>
+            </a:r>
+          </a:p>
+        </p:txBody>
+      </p:sp>
+      <p:sp>
+        <p:nvSpPr>
+          <p:cNvPr id="142" name="Rounded Rectangle 141">
+            <a:extLst>
+              <a:ext uri="{FF2B5EF4-FFF2-40B4-BE49-F238E27FC236}">
+                <a16:creationId xmlns:a16="http://schemas.microsoft.com/office/drawing/2014/main" id="{24F5A478-9D7B-9E4C-936F-51CEEB603277}"/>
+              </a:ext>
+            </a:extLst>
+          </p:cNvPr>
+          <p:cNvSpPr/>
+          <p:nvPr/>
+        </p:nvSpPr>
+        <p:spPr>
+          <a:xfrm>
+            <a:off x="5476968" y="3264766"/>
+            <a:ext cx="93143" cy="795845"/>
+          </a:xfrm>
+          <a:prstGeom prst="roundRect">
+            <a:avLst/>
+          </a:prstGeom>
+          <a:solidFill>
+            <a:schemeClr val="accent6"/>
+          </a:solidFill>
+        </p:spPr>
+        <p:style>
+          <a:lnRef idx="2">
+            <a:schemeClr val="accent1">
+              <a:shade val="50000"/>
+            </a:schemeClr>
+          </a:lnRef>
+          <a:fillRef idx="1">
+            <a:schemeClr val="accent1"/>
+          </a:fillRef>
+          <a:effectRef idx="0">
+            <a:schemeClr val="accent1"/>
+          </a:effectRef>
+          <a:fontRef idx="minor">
+            <a:schemeClr val="lt1"/>
+          </a:fontRef>
+        </p:style>
+        <p:txBody>
+          <a:bodyPr lIns="0" rIns="0" rtlCol="0" anchor="ctr"/>
+          <a:lstStyle/>
+          <a:p>
+            <a:pPr algn="ctr"/>
+            <a:endParaRPr lang="en-US" sz="1400"/>
+          </a:p>
+        </p:txBody>
+      </p:sp>
+      <p:sp>
+        <p:nvSpPr>
+          <p:cNvPr id="143" name="Right Arrow 142">
+            <a:extLst>
+              <a:ext uri="{FF2B5EF4-FFF2-40B4-BE49-F238E27FC236}">
+                <a16:creationId xmlns:a16="http://schemas.microsoft.com/office/drawing/2014/main" id="{5379B476-7935-6E43-8381-89F8C2596397}"/>
+              </a:ext>
+            </a:extLst>
+          </p:cNvPr>
+          <p:cNvSpPr/>
+          <p:nvPr/>
+        </p:nvSpPr>
+        <p:spPr>
+          <a:xfrm>
+            <a:off x="3953418" y="3341583"/>
+            <a:ext cx="1144752" cy="691978"/>
+          </a:xfrm>
+          <a:prstGeom prst="rightArrow">
+            <a:avLst/>
+          </a:prstGeom>
+          <a:solidFill>
+            <a:srgbClr val="090008"/>
+          </a:solidFill>
+          <a:ln>
+            <a:noFill/>
+          </a:ln>
+        </p:spPr>
+        <p:style>
+          <a:lnRef idx="2">
+            <a:schemeClr val="accent3">
+              <a:shade val="50000"/>
+            </a:schemeClr>
+          </a:lnRef>
+          <a:fillRef idx="1">
+            <a:schemeClr val="accent3"/>
+          </a:fillRef>
+          <a:effectRef idx="0">
+            <a:schemeClr val="accent3"/>
+          </a:effectRef>
+          <a:fontRef idx="minor">
+            <a:schemeClr val="lt1"/>
+          </a:fontRef>
+        </p:style>
+        <p:txBody>
+          <a:bodyPr wrap="none" lIns="0" tIns="0" rIns="0" bIns="0" rtlCol="0" anchor="ctr"/>
+          <a:lstStyle/>
+          <a:p>
+            <a:pPr algn="ctr"/>
+            <a:r>
+              <a:rPr lang="en-US" dirty="0"/>
+              <a:t> 3 FC layers</a:t>
+            </a:r>
+          </a:p>
+        </p:txBody>
+      </p:sp>
+      <p:sp>
+        <p:nvSpPr>
+          <p:cNvPr id="144" name="Rounded Rectangle 143">
+            <a:extLst>
+              <a:ext uri="{FF2B5EF4-FFF2-40B4-BE49-F238E27FC236}">
+                <a16:creationId xmlns:a16="http://schemas.microsoft.com/office/drawing/2014/main" id="{31AB28B1-35FD-524A-83EB-3E63123C2424}"/>
+              </a:ext>
+            </a:extLst>
+          </p:cNvPr>
+          <p:cNvSpPr/>
+          <p:nvPr/>
+        </p:nvSpPr>
+        <p:spPr>
+          <a:xfrm>
+            <a:off x="5476516" y="4468105"/>
+            <a:ext cx="93143" cy="795845"/>
+          </a:xfrm>
+          <a:prstGeom prst="roundRect">
+            <a:avLst/>
+          </a:prstGeom>
+          <a:solidFill>
+            <a:schemeClr val="accent6"/>
+          </a:solidFill>
+        </p:spPr>
+        <p:style>
+          <a:lnRef idx="2">
+            <a:schemeClr val="accent1">
+              <a:shade val="50000"/>
+            </a:schemeClr>
+          </a:lnRef>
+          <a:fillRef idx="1">
+            <a:schemeClr val="accent1"/>
+          </a:fillRef>
+          <a:effectRef idx="0">
+            <a:schemeClr val="accent1"/>
+          </a:effectRef>
+          <a:fontRef idx="minor">
+            <a:schemeClr val="lt1"/>
+          </a:fontRef>
+        </p:style>
+        <p:txBody>
+          <a:bodyPr lIns="0" rIns="0" rtlCol="0" anchor="ctr"/>
+          <a:lstStyle/>
+          <a:p>
+            <a:pPr algn="ctr"/>
+            <a:endParaRPr lang="en-US" sz="1400"/>
+          </a:p>
+        </p:txBody>
+      </p:sp>
+      <p:sp>
+        <p:nvSpPr>
+          <p:cNvPr id="145" name="Right Arrow 144">
+            <a:extLst>
+              <a:ext uri="{FF2B5EF4-FFF2-40B4-BE49-F238E27FC236}">
+                <a16:creationId xmlns:a16="http://schemas.microsoft.com/office/drawing/2014/main" id="{53F34C17-1748-D141-969A-DF8B798DB809}"/>
+              </a:ext>
+            </a:extLst>
+          </p:cNvPr>
+          <p:cNvSpPr/>
+          <p:nvPr/>
+        </p:nvSpPr>
+        <p:spPr>
+          <a:xfrm>
+            <a:off x="3997419" y="4527137"/>
+            <a:ext cx="1144752" cy="691978"/>
+          </a:xfrm>
+          <a:prstGeom prst="rightArrow">
+            <a:avLst/>
+          </a:prstGeom>
+          <a:solidFill>
+            <a:srgbClr val="090008"/>
+          </a:solidFill>
+          <a:ln>
+            <a:noFill/>
+          </a:ln>
+        </p:spPr>
+        <p:style>
+          <a:lnRef idx="2">
+            <a:schemeClr val="accent3">
+              <a:shade val="50000"/>
+            </a:schemeClr>
+          </a:lnRef>
+          <a:fillRef idx="1">
+            <a:schemeClr val="accent3"/>
+          </a:fillRef>
+          <a:effectRef idx="0">
+            <a:schemeClr val="accent3"/>
+          </a:effectRef>
+          <a:fontRef idx="minor">
+            <a:schemeClr val="lt1"/>
+          </a:fontRef>
+        </p:style>
+        <p:txBody>
+          <a:bodyPr wrap="none" lIns="0" tIns="0" rIns="0" bIns="0" rtlCol="0" anchor="ctr"/>
+          <a:lstStyle/>
+          <a:p>
+            <a:pPr algn="ctr"/>
+            <a:r>
+              <a:rPr lang="en-US" dirty="0"/>
+              <a:t> 3 FC layers</a:t>
+            </a:r>
+          </a:p>
+        </p:txBody>
+      </p:sp>
+      <p:cxnSp>
+        <p:nvCxnSpPr>
+          <p:cNvPr id="176" name="Curved Connector 175">
+            <a:extLst>
+              <a:ext uri="{FF2B5EF4-FFF2-40B4-BE49-F238E27FC236}">
+                <a16:creationId xmlns:a16="http://schemas.microsoft.com/office/drawing/2014/main" id="{58D2BE39-70AB-F74C-BA99-98C6A63BC53A}"/>
+              </a:ext>
+            </a:extLst>
+          </p:cNvPr>
+          <p:cNvCxnSpPr>
+            <a:cxnSpLocks/>
+          </p:cNvCxnSpPr>
+          <p:nvPr/>
+        </p:nvCxnSpPr>
+        <p:spPr>
+          <a:xfrm>
+            <a:off x="5465960" y="1392395"/>
+            <a:ext cx="11475" cy="1057800"/>
+          </a:xfrm>
+          <a:prstGeom prst="curvedConnector3">
+            <a:avLst>
+              <a:gd name="adj1" fmla="val -744827"/>
+            </a:avLst>
+          </a:prstGeom>
+          <a:ln>
+            <a:solidFill>
+              <a:schemeClr val="tx1"/>
+            </a:solidFill>
+            <a:prstDash val="sysDot"/>
+          </a:ln>
+        </p:spPr>
+        <p:style>
+          <a:lnRef idx="3">
+            <a:schemeClr val="accent1"/>
+          </a:lnRef>
+          <a:fillRef idx="0">
+            <a:schemeClr val="accent1"/>
+          </a:fillRef>
+          <a:effectRef idx="2">
+            <a:schemeClr val="accent1"/>
+          </a:effectRef>
+          <a:fontRef idx="minor">
+            <a:schemeClr val="tx1"/>
+          </a:fontRef>
+        </p:style>
+      </p:cxnSp>
+      <p:cxnSp>
+        <p:nvCxnSpPr>
+          <p:cNvPr id="179" name="Curved Connector 178">
+            <a:extLst>
+              <a:ext uri="{FF2B5EF4-FFF2-40B4-BE49-F238E27FC236}">
+                <a16:creationId xmlns:a16="http://schemas.microsoft.com/office/drawing/2014/main" id="{682A8E73-907F-414F-A65A-AC181512D117}"/>
+              </a:ext>
+            </a:extLst>
+          </p:cNvPr>
+          <p:cNvCxnSpPr>
+            <a:cxnSpLocks/>
+            <a:endCxn id="142" idx="1"/>
+          </p:cNvCxnSpPr>
+          <p:nvPr/>
+        </p:nvCxnSpPr>
+        <p:spPr>
+          <a:xfrm>
+            <a:off x="5465960" y="1392395"/>
+            <a:ext cx="11008" cy="2270293"/>
+          </a:xfrm>
+          <a:prstGeom prst="curvedConnector3">
+            <a:avLst>
+              <a:gd name="adj1" fmla="val -2085021"/>
+            </a:avLst>
+          </a:prstGeom>
+          <a:ln>
+            <a:solidFill>
+              <a:schemeClr val="tx1"/>
+            </a:solidFill>
+            <a:prstDash val="sysDot"/>
+          </a:ln>
+        </p:spPr>
+        <p:style>
+          <a:lnRef idx="3">
+            <a:schemeClr val="accent1"/>
+          </a:lnRef>
+          <a:fillRef idx="0">
+            <a:schemeClr val="accent1"/>
+          </a:fillRef>
+          <a:effectRef idx="2">
+            <a:schemeClr val="accent1"/>
+          </a:effectRef>
+          <a:fontRef idx="minor">
+            <a:schemeClr val="tx1"/>
+          </a:fontRef>
+        </p:style>
+      </p:cxnSp>
+      <p:cxnSp>
+        <p:nvCxnSpPr>
+          <p:cNvPr id="182" name="Curved Connector 181">
+            <a:extLst>
+              <a:ext uri="{FF2B5EF4-FFF2-40B4-BE49-F238E27FC236}">
+                <a16:creationId xmlns:a16="http://schemas.microsoft.com/office/drawing/2014/main" id="{7013CE85-1B1F-CA4A-806A-A0BA93966658}"/>
+              </a:ext>
+            </a:extLst>
+          </p:cNvPr>
+          <p:cNvCxnSpPr>
+            <a:cxnSpLocks/>
+          </p:cNvCxnSpPr>
+          <p:nvPr/>
+        </p:nvCxnSpPr>
+        <p:spPr>
+          <a:xfrm>
+            <a:off x="5552697" y="1416004"/>
+            <a:ext cx="10556" cy="3473633"/>
+          </a:xfrm>
+          <a:prstGeom prst="curvedConnector3">
+            <a:avLst>
+              <a:gd name="adj1" fmla="val -4243966"/>
+            </a:avLst>
+          </a:prstGeom>
+          <a:ln>
+            <a:solidFill>
+              <a:schemeClr val="tx1"/>
+            </a:solidFill>
+            <a:prstDash val="sysDot"/>
+          </a:ln>
+        </p:spPr>
+        <p:style>
+          <a:lnRef idx="3">
+            <a:schemeClr val="accent1"/>
+          </a:lnRef>
+          <a:fillRef idx="0">
+            <a:schemeClr val="accent1"/>
+          </a:fillRef>
+          <a:effectRef idx="2">
+            <a:schemeClr val="accent1"/>
+          </a:effectRef>
+          <a:fontRef idx="minor">
+            <a:schemeClr val="tx1"/>
+          </a:fontRef>
+        </p:style>
+      </p:cxnSp>
+      <p:cxnSp>
+        <p:nvCxnSpPr>
+          <p:cNvPr id="207" name="Straight Connector 206">
+            <a:extLst>
+              <a:ext uri="{FF2B5EF4-FFF2-40B4-BE49-F238E27FC236}">
+                <a16:creationId xmlns:a16="http://schemas.microsoft.com/office/drawing/2014/main" id="{763F43D7-B561-4144-9809-17940A683E62}"/>
+              </a:ext>
+            </a:extLst>
+          </p:cNvPr>
+          <p:cNvCxnSpPr>
+            <a:cxnSpLocks/>
+            <a:stCxn id="111" idx="3"/>
+            <a:endCxn id="95" idx="1"/>
+          </p:cNvCxnSpPr>
+          <p:nvPr/>
+        </p:nvCxnSpPr>
+        <p:spPr>
+          <a:xfrm>
+            <a:off x="5570111" y="1392392"/>
+            <a:ext cx="2229732" cy="3334"/>
+          </a:xfrm>
+          <a:prstGeom prst="line">
+            <a:avLst/>
+          </a:prstGeom>
+          <a:ln cmpd="sng">
+            <a:prstDash val="dash"/>
+          </a:ln>
+        </p:spPr>
+        <p:style>
+          <a:lnRef idx="3">
+            <a:schemeClr val="dk1"/>
+          </a:lnRef>
+          <a:fillRef idx="0">
+            <a:schemeClr val="dk1"/>
+          </a:fillRef>
+          <a:effectRef idx="2">
+            <a:schemeClr val="dk1"/>
+          </a:effectRef>
+          <a:fontRef idx="minor">
+            <a:schemeClr val="tx1"/>
+          </a:fontRef>
+        </p:style>
+      </p:cxnSp>
+      <p:cxnSp>
+        <p:nvCxnSpPr>
+          <p:cNvPr id="208" name="Straight Connector 207">
+            <a:extLst>
+              <a:ext uri="{FF2B5EF4-FFF2-40B4-BE49-F238E27FC236}">
+                <a16:creationId xmlns:a16="http://schemas.microsoft.com/office/drawing/2014/main" id="{D4F66AA6-954E-E842-A0FE-A14C45A5A482}"/>
+              </a:ext>
+            </a:extLst>
+          </p:cNvPr>
+          <p:cNvCxnSpPr>
+            <a:cxnSpLocks/>
+            <a:stCxn id="111" idx="3"/>
+            <a:endCxn id="98" idx="1"/>
+          </p:cNvCxnSpPr>
+          <p:nvPr/>
+        </p:nvCxnSpPr>
+        <p:spPr>
+          <a:xfrm>
+            <a:off x="5570111" y="1392392"/>
+            <a:ext cx="2229732" cy="1074064"/>
+          </a:xfrm>
+          <a:prstGeom prst="line">
+            <a:avLst/>
+          </a:prstGeom>
+          <a:ln cmpd="sng">
+            <a:prstDash val="dash"/>
+          </a:ln>
+        </p:spPr>
+        <p:style>
+          <a:lnRef idx="3">
+            <a:schemeClr val="dk1"/>
+          </a:lnRef>
+          <a:fillRef idx="0">
+            <a:schemeClr val="dk1"/>
+          </a:fillRef>
+          <a:effectRef idx="2">
+            <a:schemeClr val="dk1"/>
+          </a:effectRef>
+          <a:fontRef idx="minor">
+            <a:schemeClr val="tx1"/>
+          </a:fontRef>
+        </p:style>
+      </p:cxnSp>
+      <p:cxnSp>
+        <p:nvCxnSpPr>
+          <p:cNvPr id="211" name="Straight Connector 210">
+            <a:extLst>
+              <a:ext uri="{FF2B5EF4-FFF2-40B4-BE49-F238E27FC236}">
+                <a16:creationId xmlns:a16="http://schemas.microsoft.com/office/drawing/2014/main" id="{864B18A3-DE9E-714A-8951-60EA0CF92367}"/>
+              </a:ext>
+            </a:extLst>
+          </p:cNvPr>
+          <p:cNvCxnSpPr>
+            <a:cxnSpLocks/>
+            <a:stCxn id="111" idx="3"/>
+            <a:endCxn id="100" idx="1"/>
+          </p:cNvCxnSpPr>
+          <p:nvPr/>
+        </p:nvCxnSpPr>
+        <p:spPr>
+          <a:xfrm>
+            <a:off x="5570111" y="1392392"/>
+            <a:ext cx="2231731" cy="2280442"/>
+          </a:xfrm>
+          <a:prstGeom prst="line">
+            <a:avLst/>
+          </a:prstGeom>
+          <a:ln cmpd="sng">
+            <a:prstDash val="dash"/>
+          </a:ln>
+        </p:spPr>
+        <p:style>
+          <a:lnRef idx="3">
+            <a:schemeClr val="dk1"/>
+          </a:lnRef>
+          <a:fillRef idx="0">
+            <a:schemeClr val="dk1"/>
+          </a:fillRef>
+          <a:effectRef idx="2">
+            <a:schemeClr val="dk1"/>
+          </a:effectRef>
+          <a:fontRef idx="minor">
+            <a:schemeClr val="tx1"/>
+          </a:fontRef>
+        </p:style>
+      </p:cxnSp>
+      <p:cxnSp>
+        <p:nvCxnSpPr>
+          <p:cNvPr id="233" name="Straight Connector 232">
+            <a:extLst>
+              <a:ext uri="{FF2B5EF4-FFF2-40B4-BE49-F238E27FC236}">
+                <a16:creationId xmlns:a16="http://schemas.microsoft.com/office/drawing/2014/main" id="{E64B8131-951F-6747-B70A-E544C85A328F}"/>
+              </a:ext>
+            </a:extLst>
+          </p:cNvPr>
+          <p:cNvCxnSpPr>
+            <a:cxnSpLocks/>
+            <a:stCxn id="111" idx="3"/>
+            <a:endCxn id="105" idx="1"/>
+          </p:cNvCxnSpPr>
+          <p:nvPr/>
+        </p:nvCxnSpPr>
+        <p:spPr>
+          <a:xfrm>
+            <a:off x="5570111" y="1392392"/>
+            <a:ext cx="2247006" cy="3497245"/>
+          </a:xfrm>
+          <a:prstGeom prst="line">
+            <a:avLst/>
+          </a:prstGeom>
+          <a:ln cmpd="sng">
+            <a:prstDash val="dash"/>
+          </a:ln>
+        </p:spPr>
+        <p:style>
+          <a:lnRef idx="3">
+            <a:schemeClr val="dk1"/>
+          </a:lnRef>
+          <a:fillRef idx="0">
+            <a:schemeClr val="dk1"/>
+          </a:fillRef>
+          <a:effectRef idx="2">
+            <a:schemeClr val="dk1"/>
+          </a:effectRef>
+          <a:fontRef idx="minor">
+            <a:schemeClr val="tx1"/>
+          </a:fontRef>
+        </p:style>
+      </p:cxnSp>
+      <p:cxnSp>
+        <p:nvCxnSpPr>
+          <p:cNvPr id="99" name="Curved Connector 98">
+            <a:extLst>
+              <a:ext uri="{FF2B5EF4-FFF2-40B4-BE49-F238E27FC236}">
+                <a16:creationId xmlns:a16="http://schemas.microsoft.com/office/drawing/2014/main" id="{9B8A3754-9E71-9383-A235-458ACE0E8FF6}"/>
+              </a:ext>
+            </a:extLst>
+          </p:cNvPr>
+          <p:cNvCxnSpPr>
+            <a:cxnSpLocks/>
+            <a:stCxn id="140" idx="1"/>
+            <a:endCxn id="142" idx="1"/>
+          </p:cNvCxnSpPr>
+          <p:nvPr/>
+        </p:nvCxnSpPr>
+        <p:spPr>
+          <a:xfrm rot="10800000" flipV="1">
+            <a:off x="5476968" y="2450192"/>
+            <a:ext cx="12700" cy="1212495"/>
+          </a:xfrm>
+          <a:prstGeom prst="curvedConnector3">
+            <a:avLst>
+              <a:gd name="adj1" fmla="val 1800000"/>
+            </a:avLst>
+          </a:prstGeom>
+          <a:ln>
+            <a:solidFill>
+              <a:schemeClr val="tx1"/>
+            </a:solidFill>
+            <a:prstDash val="sysDot"/>
+          </a:ln>
+        </p:spPr>
+        <p:style>
+          <a:lnRef idx="3">
+            <a:schemeClr val="accent1"/>
+          </a:lnRef>
+          <a:fillRef idx="0">
+            <a:schemeClr val="accent1"/>
+          </a:fillRef>
+          <a:effectRef idx="2">
+            <a:schemeClr val="accent1"/>
+          </a:effectRef>
+          <a:fontRef idx="minor">
+            <a:schemeClr val="tx1"/>
+          </a:fontRef>
+        </p:style>
+      </p:cxnSp>
+      <p:cxnSp>
+        <p:nvCxnSpPr>
+          <p:cNvPr id="103" name="Curved Connector 102">
+            <a:extLst>
+              <a:ext uri="{FF2B5EF4-FFF2-40B4-BE49-F238E27FC236}">
+                <a16:creationId xmlns:a16="http://schemas.microsoft.com/office/drawing/2014/main" id="{E5898256-EF1E-907C-9EEB-7B6EE9CE3088}"/>
+              </a:ext>
+            </a:extLst>
+          </p:cNvPr>
+          <p:cNvCxnSpPr>
+            <a:cxnSpLocks/>
+            <a:stCxn id="140" idx="1"/>
+            <a:endCxn id="144" idx="1"/>
+          </p:cNvCxnSpPr>
+          <p:nvPr/>
+        </p:nvCxnSpPr>
+        <p:spPr>
+          <a:xfrm rot="10800000" flipV="1">
+            <a:off x="5476516" y="2450192"/>
+            <a:ext cx="452" cy="2415835"/>
+          </a:xfrm>
+          <a:prstGeom prst="curvedConnector3">
+            <a:avLst>
+              <a:gd name="adj1" fmla="val 50675221"/>
+            </a:avLst>
+          </a:prstGeom>
+          <a:ln>
+            <a:solidFill>
+              <a:schemeClr val="tx1"/>
+            </a:solidFill>
+            <a:prstDash val="sysDot"/>
+          </a:ln>
+        </p:spPr>
+        <p:style>
+          <a:lnRef idx="3">
+            <a:schemeClr val="accent1"/>
+          </a:lnRef>
+          <a:fillRef idx="0">
+            <a:schemeClr val="accent1"/>
+          </a:fillRef>
+          <a:effectRef idx="2">
+            <a:schemeClr val="accent1"/>
+          </a:effectRef>
+          <a:fontRef idx="minor">
+            <a:schemeClr val="tx1"/>
+          </a:fontRef>
+        </p:style>
+      </p:cxnSp>
+      <p:cxnSp>
+        <p:nvCxnSpPr>
+          <p:cNvPr id="117" name="Curved Connector 116">
+            <a:extLst>
+              <a:ext uri="{FF2B5EF4-FFF2-40B4-BE49-F238E27FC236}">
+                <a16:creationId xmlns:a16="http://schemas.microsoft.com/office/drawing/2014/main" id="{9CAB588E-1021-B007-63B8-79C8D6F528DD}"/>
+              </a:ext>
+            </a:extLst>
+          </p:cNvPr>
+          <p:cNvCxnSpPr>
+            <a:cxnSpLocks/>
+            <a:stCxn id="142" idx="1"/>
+            <a:endCxn id="144" idx="1"/>
+          </p:cNvCxnSpPr>
+          <p:nvPr/>
+        </p:nvCxnSpPr>
+        <p:spPr>
+          <a:xfrm rot="10800000" flipV="1">
+            <a:off x="5476516" y="3662688"/>
+            <a:ext cx="452" cy="1203340"/>
+          </a:xfrm>
+          <a:prstGeom prst="curvedConnector3">
+            <a:avLst>
+              <a:gd name="adj1" fmla="val 50675221"/>
+            </a:avLst>
+          </a:prstGeom>
+          <a:ln>
+            <a:solidFill>
+              <a:schemeClr val="tx1"/>
+            </a:solidFill>
+            <a:prstDash val="sysDot"/>
+          </a:ln>
+        </p:spPr>
+        <p:style>
+          <a:lnRef idx="3">
+            <a:schemeClr val="accent1"/>
+          </a:lnRef>
+          <a:fillRef idx="0">
+            <a:schemeClr val="accent1"/>
+          </a:fillRef>
+          <a:effectRef idx="2">
+            <a:schemeClr val="accent1"/>
+          </a:effectRef>
+          <a:fontRef idx="minor">
+            <a:schemeClr val="tx1"/>
+          </a:fontRef>
+        </p:style>
+      </p:cxnSp>
+      <p:cxnSp>
+        <p:nvCxnSpPr>
+          <p:cNvPr id="162" name="Straight Connector 161">
+            <a:extLst>
+              <a:ext uri="{FF2B5EF4-FFF2-40B4-BE49-F238E27FC236}">
+                <a16:creationId xmlns:a16="http://schemas.microsoft.com/office/drawing/2014/main" id="{69E8572A-77F3-056C-4DB9-5415DAF4E2BE}"/>
+              </a:ext>
+            </a:extLst>
+          </p:cNvPr>
+          <p:cNvCxnSpPr>
+            <a:cxnSpLocks/>
+            <a:stCxn id="140" idx="3"/>
+            <a:endCxn id="95" idx="1"/>
+          </p:cNvCxnSpPr>
+          <p:nvPr/>
+        </p:nvCxnSpPr>
+        <p:spPr>
+          <a:xfrm flipV="1">
+            <a:off x="5570111" y="1395726"/>
+            <a:ext cx="2229732" cy="1054468"/>
+          </a:xfrm>
+          <a:prstGeom prst="line">
+            <a:avLst/>
+          </a:prstGeom>
+          <a:ln cmpd="sng">
+            <a:prstDash val="dash"/>
+          </a:ln>
+        </p:spPr>
+        <p:style>
+          <a:lnRef idx="3">
+            <a:schemeClr val="dk1"/>
+          </a:lnRef>
+          <a:fillRef idx="0">
+            <a:schemeClr val="dk1"/>
+          </a:fillRef>
+          <a:effectRef idx="2">
+            <a:schemeClr val="dk1"/>
+          </a:effectRef>
+          <a:fontRef idx="minor">
+            <a:schemeClr val="tx1"/>
+          </a:fontRef>
+        </p:style>
+      </p:cxnSp>
+      <p:cxnSp>
+        <p:nvCxnSpPr>
+          <p:cNvPr id="165" name="Straight Connector 164">
+            <a:extLst>
+              <a:ext uri="{FF2B5EF4-FFF2-40B4-BE49-F238E27FC236}">
+                <a16:creationId xmlns:a16="http://schemas.microsoft.com/office/drawing/2014/main" id="{74DB4A98-3B3B-0A05-7E73-ECA67BB5F7B1}"/>
+              </a:ext>
+            </a:extLst>
+          </p:cNvPr>
+          <p:cNvCxnSpPr>
+            <a:cxnSpLocks/>
+            <a:stCxn id="140" idx="3"/>
+            <a:endCxn id="98" idx="1"/>
+          </p:cNvCxnSpPr>
+          <p:nvPr/>
+        </p:nvCxnSpPr>
+        <p:spPr>
+          <a:xfrm>
+            <a:off x="5570111" y="2450194"/>
+            <a:ext cx="2229732" cy="16262"/>
+          </a:xfrm>
+          <a:prstGeom prst="line">
+            <a:avLst/>
+          </a:prstGeom>
+          <a:ln cmpd="sng">
+            <a:prstDash val="dash"/>
+          </a:ln>
+        </p:spPr>
+        <p:style>
+          <a:lnRef idx="3">
+            <a:schemeClr val="dk1"/>
+          </a:lnRef>
+          <a:fillRef idx="0">
+            <a:schemeClr val="dk1"/>
+          </a:fillRef>
+          <a:effectRef idx="2">
+            <a:schemeClr val="dk1"/>
+          </a:effectRef>
+          <a:fontRef idx="minor">
+            <a:schemeClr val="tx1"/>
+          </a:fontRef>
+        </p:style>
+      </p:cxnSp>
+      <p:cxnSp>
+        <p:nvCxnSpPr>
+          <p:cNvPr id="168" name="Straight Connector 167">
+            <a:extLst>
+              <a:ext uri="{FF2B5EF4-FFF2-40B4-BE49-F238E27FC236}">
+                <a16:creationId xmlns:a16="http://schemas.microsoft.com/office/drawing/2014/main" id="{CD52F23D-7293-806C-631C-27A0DBF55D57}"/>
+              </a:ext>
+            </a:extLst>
+          </p:cNvPr>
+          <p:cNvCxnSpPr>
+            <a:cxnSpLocks/>
+            <a:stCxn id="140" idx="3"/>
+            <a:endCxn id="100" idx="1"/>
+          </p:cNvCxnSpPr>
+          <p:nvPr/>
+        </p:nvCxnSpPr>
+        <p:spPr>
+          <a:xfrm>
+            <a:off x="5570111" y="2450194"/>
+            <a:ext cx="2231731" cy="1222640"/>
+          </a:xfrm>
+          <a:prstGeom prst="line">
+            <a:avLst/>
+          </a:prstGeom>
+          <a:ln cmpd="sng">
+            <a:prstDash val="dash"/>
+          </a:ln>
+        </p:spPr>
+        <p:style>
+          <a:lnRef idx="3">
+            <a:schemeClr val="dk1"/>
+          </a:lnRef>
+          <a:fillRef idx="0">
+            <a:schemeClr val="dk1"/>
+          </a:fillRef>
+          <a:effectRef idx="2">
+            <a:schemeClr val="dk1"/>
+          </a:effectRef>
+          <a:fontRef idx="minor">
+            <a:schemeClr val="tx1"/>
+          </a:fontRef>
+        </p:style>
+      </p:cxnSp>
+      <p:cxnSp>
+        <p:nvCxnSpPr>
+          <p:cNvPr id="171" name="Straight Connector 170">
+            <a:extLst>
+              <a:ext uri="{FF2B5EF4-FFF2-40B4-BE49-F238E27FC236}">
+                <a16:creationId xmlns:a16="http://schemas.microsoft.com/office/drawing/2014/main" id="{0CFA1D41-6379-B46E-3042-04DD533A9B93}"/>
+              </a:ext>
+            </a:extLst>
+          </p:cNvPr>
+          <p:cNvCxnSpPr>
+            <a:cxnSpLocks/>
+            <a:stCxn id="140" idx="3"/>
+            <a:endCxn id="105" idx="1"/>
+          </p:cNvCxnSpPr>
+          <p:nvPr/>
+        </p:nvCxnSpPr>
+        <p:spPr>
+          <a:xfrm>
+            <a:off x="5570111" y="2450194"/>
+            <a:ext cx="2247006" cy="2439443"/>
+          </a:xfrm>
+          <a:prstGeom prst="line">
+            <a:avLst/>
+          </a:prstGeom>
+          <a:ln cmpd="sng">
+            <a:prstDash val="dash"/>
+          </a:ln>
+        </p:spPr>
+        <p:style>
+          <a:lnRef idx="3">
+            <a:schemeClr val="dk1"/>
+          </a:lnRef>
+          <a:fillRef idx="0">
+            <a:schemeClr val="dk1"/>
+          </a:fillRef>
+          <a:effectRef idx="2">
+            <a:schemeClr val="dk1"/>
+          </a:effectRef>
+          <a:fontRef idx="minor">
+            <a:schemeClr val="tx1"/>
+          </a:fontRef>
+        </p:style>
+      </p:cxnSp>
+      <p:cxnSp>
+        <p:nvCxnSpPr>
+          <p:cNvPr id="174" name="Straight Connector 173">
+            <a:extLst>
+              <a:ext uri="{FF2B5EF4-FFF2-40B4-BE49-F238E27FC236}">
+                <a16:creationId xmlns:a16="http://schemas.microsoft.com/office/drawing/2014/main" id="{996BC28C-E200-3BD6-A70A-B7CB0333AE35}"/>
+              </a:ext>
+            </a:extLst>
+          </p:cNvPr>
+          <p:cNvCxnSpPr>
+            <a:cxnSpLocks/>
+            <a:stCxn id="142" idx="3"/>
+            <a:endCxn id="95" idx="1"/>
+          </p:cNvCxnSpPr>
+          <p:nvPr/>
+        </p:nvCxnSpPr>
+        <p:spPr>
+          <a:xfrm flipV="1">
+            <a:off x="5570111" y="1395726"/>
+            <a:ext cx="2229732" cy="2266963"/>
+          </a:xfrm>
+          <a:prstGeom prst="line">
+            <a:avLst/>
+          </a:prstGeom>
+          <a:ln cmpd="sng">
+            <a:prstDash val="dash"/>
+          </a:ln>
+        </p:spPr>
+        <p:style>
+          <a:lnRef idx="3">
+            <a:schemeClr val="dk1"/>
+          </a:lnRef>
+          <a:fillRef idx="0">
+            <a:schemeClr val="dk1"/>
+          </a:fillRef>
+          <a:effectRef idx="2">
+            <a:schemeClr val="dk1"/>
+          </a:effectRef>
+          <a:fontRef idx="minor">
+            <a:schemeClr val="tx1"/>
+          </a:fontRef>
+        </p:style>
+      </p:cxnSp>
+      <p:cxnSp>
+        <p:nvCxnSpPr>
+          <p:cNvPr id="178" name="Straight Connector 177">
+            <a:extLst>
+              <a:ext uri="{FF2B5EF4-FFF2-40B4-BE49-F238E27FC236}">
+                <a16:creationId xmlns:a16="http://schemas.microsoft.com/office/drawing/2014/main" id="{FA76C5BA-2CA2-A81D-59C9-C0D5692C6B18}"/>
+              </a:ext>
+            </a:extLst>
+          </p:cNvPr>
+          <p:cNvCxnSpPr>
+            <a:cxnSpLocks/>
+            <a:stCxn id="144" idx="3"/>
+            <a:endCxn id="95" idx="1"/>
+          </p:cNvCxnSpPr>
+          <p:nvPr/>
+        </p:nvCxnSpPr>
+        <p:spPr>
+          <a:xfrm flipV="1">
+            <a:off x="5569659" y="1395726"/>
+            <a:ext cx="2230184" cy="3470302"/>
+          </a:xfrm>
+          <a:prstGeom prst="line">
+            <a:avLst/>
+          </a:prstGeom>
+          <a:ln cmpd="sng">
+            <a:prstDash val="dash"/>
+          </a:ln>
+        </p:spPr>
+        <p:style>
+          <a:lnRef idx="3">
+            <a:schemeClr val="dk1"/>
+          </a:lnRef>
+          <a:fillRef idx="0">
+            <a:schemeClr val="dk1"/>
+          </a:fillRef>
+          <a:effectRef idx="2">
+            <a:schemeClr val="dk1"/>
+          </a:effectRef>
+          <a:fontRef idx="minor">
+            <a:schemeClr val="tx1"/>
+          </a:fontRef>
+        </p:style>
+      </p:cxnSp>
+      <p:cxnSp>
+        <p:nvCxnSpPr>
+          <p:cNvPr id="183" name="Straight Connector 182">
+            <a:extLst>
+              <a:ext uri="{FF2B5EF4-FFF2-40B4-BE49-F238E27FC236}">
+                <a16:creationId xmlns:a16="http://schemas.microsoft.com/office/drawing/2014/main" id="{DE4AA7AA-BBCC-35A7-225F-85C2B48506DE}"/>
+              </a:ext>
+            </a:extLst>
+          </p:cNvPr>
+          <p:cNvCxnSpPr>
+            <a:cxnSpLocks/>
+            <a:stCxn id="142" idx="3"/>
+            <a:endCxn id="98" idx="1"/>
+          </p:cNvCxnSpPr>
+          <p:nvPr/>
+        </p:nvCxnSpPr>
+        <p:spPr>
+          <a:xfrm flipV="1">
+            <a:off x="5570111" y="2466456"/>
+            <a:ext cx="2229732" cy="1196233"/>
+          </a:xfrm>
+          <a:prstGeom prst="line">
+            <a:avLst/>
+          </a:prstGeom>
+          <a:ln cmpd="sng">
+            <a:prstDash val="dash"/>
+          </a:ln>
+        </p:spPr>
+        <p:style>
+          <a:lnRef idx="3">
+            <a:schemeClr val="dk1"/>
+          </a:lnRef>
+          <a:fillRef idx="0">
+            <a:schemeClr val="dk1"/>
+          </a:fillRef>
+          <a:effectRef idx="2">
+            <a:schemeClr val="dk1"/>
+          </a:effectRef>
+          <a:fontRef idx="minor">
+            <a:schemeClr val="tx1"/>
+          </a:fontRef>
+        </p:style>
+      </p:cxnSp>
+      <p:cxnSp>
+        <p:nvCxnSpPr>
+          <p:cNvPr id="186" name="Straight Connector 185">
+            <a:extLst>
+              <a:ext uri="{FF2B5EF4-FFF2-40B4-BE49-F238E27FC236}">
+                <a16:creationId xmlns:a16="http://schemas.microsoft.com/office/drawing/2014/main" id="{8566EB2C-E2B6-86D2-6AE7-98F42D497168}"/>
+              </a:ext>
+            </a:extLst>
+          </p:cNvPr>
+          <p:cNvCxnSpPr>
+            <a:cxnSpLocks/>
+            <a:stCxn id="142" idx="3"/>
+            <a:endCxn id="100" idx="1"/>
+          </p:cNvCxnSpPr>
+          <p:nvPr/>
+        </p:nvCxnSpPr>
+        <p:spPr>
+          <a:xfrm>
+            <a:off x="5570111" y="3662689"/>
+            <a:ext cx="2231731" cy="10145"/>
+          </a:xfrm>
+          <a:prstGeom prst="line">
+            <a:avLst/>
+          </a:prstGeom>
+          <a:ln cmpd="sng">
+            <a:prstDash val="dash"/>
+          </a:ln>
+        </p:spPr>
+        <p:style>
+          <a:lnRef idx="3">
+            <a:schemeClr val="dk1"/>
+          </a:lnRef>
+          <a:fillRef idx="0">
+            <a:schemeClr val="dk1"/>
+          </a:fillRef>
+          <a:effectRef idx="2">
+            <a:schemeClr val="dk1"/>
+          </a:effectRef>
+          <a:fontRef idx="minor">
+            <a:schemeClr val="tx1"/>
+          </a:fontRef>
+        </p:style>
+      </p:cxnSp>
+      <p:cxnSp>
+        <p:nvCxnSpPr>
+          <p:cNvPr id="189" name="Straight Connector 188">
+            <a:extLst>
+              <a:ext uri="{FF2B5EF4-FFF2-40B4-BE49-F238E27FC236}">
+                <a16:creationId xmlns:a16="http://schemas.microsoft.com/office/drawing/2014/main" id="{D8A71980-87A0-0CC8-102B-27C704127F59}"/>
+              </a:ext>
+            </a:extLst>
+          </p:cNvPr>
+          <p:cNvCxnSpPr>
+            <a:cxnSpLocks/>
+            <a:stCxn id="142" idx="3"/>
+            <a:endCxn id="105" idx="1"/>
+          </p:cNvCxnSpPr>
+          <p:nvPr/>
+        </p:nvCxnSpPr>
+        <p:spPr>
+          <a:xfrm>
+            <a:off x="5570111" y="3662689"/>
+            <a:ext cx="2247006" cy="1226948"/>
+          </a:xfrm>
+          <a:prstGeom prst="line">
+            <a:avLst/>
+          </a:prstGeom>
+          <a:ln cmpd="sng">
+            <a:prstDash val="dash"/>
+          </a:ln>
+        </p:spPr>
+        <p:style>
+          <a:lnRef idx="3">
+            <a:schemeClr val="dk1"/>
+          </a:lnRef>
+          <a:fillRef idx="0">
+            <a:schemeClr val="dk1"/>
+          </a:fillRef>
+          <a:effectRef idx="2">
+            <a:schemeClr val="dk1"/>
+          </a:effectRef>
+          <a:fontRef idx="minor">
+            <a:schemeClr val="tx1"/>
+          </a:fontRef>
+        </p:style>
+      </p:cxnSp>
+      <p:cxnSp>
+        <p:nvCxnSpPr>
+          <p:cNvPr id="192" name="Straight Connector 191">
+            <a:extLst>
+              <a:ext uri="{FF2B5EF4-FFF2-40B4-BE49-F238E27FC236}">
+                <a16:creationId xmlns:a16="http://schemas.microsoft.com/office/drawing/2014/main" id="{D85547D0-B85C-499A-0434-BE1B09BA39B3}"/>
+              </a:ext>
+            </a:extLst>
+          </p:cNvPr>
+          <p:cNvCxnSpPr>
+            <a:cxnSpLocks/>
+            <a:stCxn id="144" idx="3"/>
+            <a:endCxn id="105" idx="1"/>
+          </p:cNvCxnSpPr>
+          <p:nvPr/>
+        </p:nvCxnSpPr>
+        <p:spPr>
+          <a:xfrm>
+            <a:off x="5569659" y="4866028"/>
+            <a:ext cx="2247458" cy="23609"/>
+          </a:xfrm>
+          <a:prstGeom prst="line">
+            <a:avLst/>
+          </a:prstGeom>
+          <a:ln cmpd="sng">
+            <a:prstDash val="dash"/>
+          </a:ln>
+        </p:spPr>
+        <p:style>
+          <a:lnRef idx="3">
+            <a:schemeClr val="dk1"/>
+          </a:lnRef>
+          <a:fillRef idx="0">
+            <a:schemeClr val="dk1"/>
+          </a:fillRef>
+          <a:effectRef idx="2">
+            <a:schemeClr val="dk1"/>
+          </a:effectRef>
+          <a:fontRef idx="minor">
+            <a:schemeClr val="tx1"/>
+          </a:fontRef>
+        </p:style>
+      </p:cxnSp>
+      <p:cxnSp>
+        <p:nvCxnSpPr>
+          <p:cNvPr id="195" name="Straight Connector 194">
+            <a:extLst>
+              <a:ext uri="{FF2B5EF4-FFF2-40B4-BE49-F238E27FC236}">
+                <a16:creationId xmlns:a16="http://schemas.microsoft.com/office/drawing/2014/main" id="{2BC89DCD-F066-033E-C814-0444515FD722}"/>
+              </a:ext>
+            </a:extLst>
+          </p:cNvPr>
+          <p:cNvCxnSpPr>
+            <a:cxnSpLocks/>
+            <a:stCxn id="144" idx="3"/>
+            <a:endCxn id="100" idx="1"/>
+          </p:cNvCxnSpPr>
+          <p:nvPr/>
+        </p:nvCxnSpPr>
+        <p:spPr>
+          <a:xfrm flipV="1">
+            <a:off x="5569659" y="3672834"/>
+            <a:ext cx="2232183" cy="1193194"/>
+          </a:xfrm>
+          <a:prstGeom prst="line">
+            <a:avLst/>
+          </a:prstGeom>
+          <a:ln cmpd="sng">
+            <a:prstDash val="dash"/>
+          </a:ln>
+        </p:spPr>
+        <p:style>
+          <a:lnRef idx="3">
+            <a:schemeClr val="dk1"/>
+          </a:lnRef>
+          <a:fillRef idx="0">
+            <a:schemeClr val="dk1"/>
+          </a:fillRef>
+          <a:effectRef idx="2">
+            <a:schemeClr val="dk1"/>
+          </a:effectRef>
+          <a:fontRef idx="minor">
+            <a:schemeClr val="tx1"/>
+          </a:fontRef>
+        </p:style>
+      </p:cxnSp>
+      <p:cxnSp>
+        <p:nvCxnSpPr>
+          <p:cNvPr id="198" name="Straight Connector 197">
+            <a:extLst>
+              <a:ext uri="{FF2B5EF4-FFF2-40B4-BE49-F238E27FC236}">
+                <a16:creationId xmlns:a16="http://schemas.microsoft.com/office/drawing/2014/main" id="{44AD7253-BEA2-01F9-A644-CF884268D02E}"/>
+              </a:ext>
+            </a:extLst>
+          </p:cNvPr>
+          <p:cNvCxnSpPr>
+            <a:cxnSpLocks/>
+            <a:stCxn id="144" idx="3"/>
+            <a:endCxn id="98" idx="1"/>
+          </p:cNvCxnSpPr>
+          <p:nvPr/>
+        </p:nvCxnSpPr>
+        <p:spPr>
+          <a:xfrm flipV="1">
+            <a:off x="5569659" y="2466456"/>
+            <a:ext cx="2230184" cy="2399572"/>
+          </a:xfrm>
+          <a:prstGeom prst="line">
+            <a:avLst/>
+          </a:prstGeom>
+          <a:ln cmpd="sng">
+            <a:prstDash val="dash"/>
+          </a:ln>
+        </p:spPr>
+        <p:style>
+          <a:lnRef idx="3">
+            <a:schemeClr val="dk1"/>
+          </a:lnRef>
+          <a:fillRef idx="0">
+            <a:schemeClr val="dk1"/>
+          </a:fillRef>
+          <a:effectRef idx="2">
+            <a:schemeClr val="dk1"/>
+          </a:effectRef>
+          <a:fontRef idx="minor">
+            <a:schemeClr val="tx1"/>
+          </a:fontRef>
+        </p:style>
+      </p:cxnSp>
+    </p:spTree>
+    <p:extLst>
+      <p:ext uri="{BB962C8B-B14F-4D97-AF65-F5344CB8AC3E}">
+        <p14:creationId xmlns:p14="http://schemas.microsoft.com/office/powerpoint/2010/main" val="3833713550"/>
       </p:ext>
     </p:extLst>
   </p:cSld>
@@ -17611,10 +20816,10 @@
         </p:nvGrpSpPr>
         <p:grpSpPr>
           <a:xfrm>
-            <a:off x="-58675" y="854133"/>
-            <a:ext cx="12309350" cy="4976355"/>
-            <a:chOff x="84476" y="870812"/>
-            <a:chExt cx="11078972" cy="4478946"/>
+            <a:off x="145931" y="977528"/>
+            <a:ext cx="12143290" cy="4398405"/>
+            <a:chOff x="-297141" y="854729"/>
+            <a:chExt cx="12096526" cy="4505814"/>
           </a:xfrm>
         </p:grpSpPr>
         <p:sp>
@@ -17631,8 +20836,8 @@
           </p:nvSpPr>
           <p:spPr>
             <a:xfrm>
-              <a:off x="88968" y="1180908"/>
-              <a:ext cx="1269777" cy="249312"/>
+              <a:off x="-290312" y="1061912"/>
+              <a:ext cx="1269777" cy="526324"/>
             </a:xfrm>
             <a:prstGeom prst="rect">
               <a:avLst/>
@@ -17649,12 +20854,20 @@
             <a:lstStyle/>
             <a:p>
               <a:r>
-                <a:rPr lang="en-US" sz="1200" dirty="0">
+                <a:rPr lang="en-US" sz="1600" dirty="0">
                   <a:cs typeface="Arial"/>
                 </a:rPr>
-                <a:t>Modality 1: Text</a:t>
+                <a:t>Modality 1:</a:t>
               </a:r>
-              <a:endParaRPr lang="en-US" sz="1200" dirty="0">
+            </a:p>
+            <a:p>
+              <a:r>
+                <a:rPr lang="en-US" sz="1600" dirty="0">
+                  <a:cs typeface="Arial"/>
+                </a:rPr>
+                <a:t>Text</a:t>
+              </a:r>
+              <a:endParaRPr lang="en-US" sz="1600" dirty="0">
                 <a:cs typeface="Calibri"/>
               </a:endParaRPr>
             </a:p>
@@ -17674,8 +20887,8 @@
           </p:nvSpPr>
           <p:spPr>
             <a:xfrm>
-              <a:off x="88968" y="3463214"/>
-              <a:ext cx="1269777" cy="249312"/>
+              <a:off x="-292649" y="3482135"/>
+              <a:ext cx="1314694" cy="526324"/>
             </a:xfrm>
             <a:prstGeom prst="rect">
               <a:avLst/>
@@ -17692,12 +20905,12 @@
             <a:lstStyle/>
             <a:p>
               <a:r>
-                <a:rPr lang="en-US" sz="1200" dirty="0">
+                <a:rPr lang="en-US" sz="1600" dirty="0">
                   <a:cs typeface="Arial"/>
                 </a:rPr>
                 <a:t>Modality 3: Depth</a:t>
               </a:r>
-              <a:endParaRPr lang="en-US" sz="1200" dirty="0">
+              <a:endParaRPr lang="en-US" sz="1600" dirty="0">
                 <a:cs typeface="Calibri"/>
               </a:endParaRPr>
             </a:p>
@@ -17717,8 +20930,8 @@
           </p:nvSpPr>
           <p:spPr>
             <a:xfrm>
-              <a:off x="88968" y="2218932"/>
-              <a:ext cx="1269777" cy="249312"/>
+              <a:off x="-283076" y="2173892"/>
+              <a:ext cx="1269777" cy="526324"/>
             </a:xfrm>
             <a:prstGeom prst="rect">
               <a:avLst/>
@@ -17735,12 +20948,20 @@
             <a:lstStyle/>
             <a:p>
               <a:r>
-                <a:rPr lang="en-US" sz="1200" dirty="0">
+                <a:rPr lang="en-US" sz="1600" dirty="0">
                   <a:cs typeface="Arial"/>
                 </a:rPr>
-                <a:t>Modality 2: RGB</a:t>
+                <a:t>Modality 2:</a:t>
               </a:r>
-              <a:endParaRPr lang="en-US" sz="1200" dirty="0">
+            </a:p>
+            <a:p>
+              <a:r>
+                <a:rPr lang="en-US" sz="1600" dirty="0">
+                  <a:cs typeface="Arial"/>
+                </a:rPr>
+                <a:t>RGB</a:t>
+              </a:r>
+              <a:endParaRPr lang="en-US" sz="1600" dirty="0">
                 <a:cs typeface="Calibri"/>
               </a:endParaRPr>
             </a:p>
@@ -17760,7 +20981,7 @@
           </p:nvSpPr>
           <p:spPr>
             <a:xfrm>
-              <a:off x="9587751" y="999219"/>
+              <a:off x="9845770" y="1010003"/>
               <a:ext cx="1442922" cy="587820"/>
             </a:xfrm>
             <a:prstGeom prst="roundRect">
@@ -17797,7 +21018,7 @@
             <a:p>
               <a:pPr algn="ctr"/>
               <a:r>
-                <a:rPr lang="en-US" sz="1400" dirty="0">
+                <a:rPr lang="en-US" dirty="0">
                   <a:solidFill>
                     <a:srgbClr val="000000"/>
                   </a:solidFill>
@@ -17835,7 +21056,7 @@
           </p:blipFill>
           <p:spPr>
             <a:xfrm>
-              <a:off x="1782300" y="2056756"/>
+              <a:off x="1251187" y="2083944"/>
               <a:ext cx="579592" cy="587820"/>
             </a:xfrm>
             <a:prstGeom prst="rect">
@@ -17870,7 +21091,7 @@
           </p:blipFill>
           <p:spPr>
             <a:xfrm>
-              <a:off x="9819625" y="1989346"/>
+              <a:off x="10077644" y="2000130"/>
               <a:ext cx="790498" cy="802179"/>
             </a:xfrm>
             <a:prstGeom prst="rect">
@@ -17900,7 +21121,7 @@
           </p:blipFill>
           <p:spPr>
             <a:xfrm>
-              <a:off x="9706045" y="2972783"/>
+              <a:off x="9964064" y="2983567"/>
               <a:ext cx="1210317" cy="1286146"/>
             </a:xfrm>
             <a:prstGeom prst="rect">
@@ -17930,7 +21151,7 @@
           </p:blipFill>
           <p:spPr>
             <a:xfrm>
-              <a:off x="1436539" y="2979456"/>
+              <a:off x="905427" y="3006644"/>
               <a:ext cx="1210317" cy="1286146"/>
             </a:xfrm>
             <a:prstGeom prst="rect">
@@ -17967,8 +21188,8 @@
           </p:blipFill>
           <p:spPr>
             <a:xfrm>
-              <a:off x="1358811" y="4810997"/>
-              <a:ext cx="1210317" cy="455137"/>
+              <a:off x="829517" y="4893651"/>
+              <a:ext cx="1210317" cy="455138"/>
             </a:xfrm>
             <a:prstGeom prst="rect">
               <a:avLst/>
@@ -17989,8 +21210,8 @@
           </p:nvSpPr>
           <p:spPr>
             <a:xfrm>
-              <a:off x="1460237" y="4610233"/>
-              <a:ext cx="1058303" cy="249312"/>
+              <a:off x="829969" y="4637421"/>
+              <a:ext cx="1613466" cy="346821"/>
             </a:xfrm>
             <a:prstGeom prst="rect">
               <a:avLst/>
@@ -18004,7 +21225,7 @@
             <a:lstStyle/>
             <a:p>
               <a:r>
-                <a:rPr lang="en-US" sz="1200" dirty="0">
+                <a:rPr lang="en-US" sz="1600" dirty="0">
                   <a:solidFill>
                     <a:srgbClr val="000000"/>
                   </a:solidFill>
@@ -18044,8 +21265,8 @@
           </p:blipFill>
           <p:spPr>
             <a:xfrm>
-              <a:off x="9752659" y="4894621"/>
-              <a:ext cx="1210317" cy="455137"/>
+              <a:off x="10010678" y="4905405"/>
+              <a:ext cx="1210317" cy="455138"/>
             </a:xfrm>
             <a:prstGeom prst="rect">
               <a:avLst/>
@@ -18066,8 +21287,8 @@
           </p:nvSpPr>
           <p:spPr>
             <a:xfrm>
-              <a:off x="9717218" y="4648066"/>
-              <a:ext cx="1446230" cy="249312"/>
+              <a:off x="9742664" y="4666780"/>
+              <a:ext cx="2056721" cy="346821"/>
             </a:xfrm>
             <a:prstGeom prst="rect">
               <a:avLst/>
@@ -18081,7 +21302,7 @@
             <a:lstStyle/>
             <a:p>
               <a:r>
-                <a:rPr lang="en-US" sz="1200" dirty="0">
+                <a:rPr lang="en-US" sz="1600" dirty="0">
                   <a:solidFill>
                     <a:srgbClr val="000000"/>
                   </a:solidFill>
@@ -18106,8 +21327,8 @@
           </p:nvSpPr>
           <p:spPr>
             <a:xfrm>
-              <a:off x="84476" y="4731567"/>
-              <a:ext cx="1269777" cy="249312"/>
+              <a:off x="-297141" y="4750488"/>
+              <a:ext cx="1269777" cy="526324"/>
             </a:xfrm>
             <a:prstGeom prst="rect">
               <a:avLst/>
@@ -18124,12 +21345,12 @@
             <a:lstStyle/>
             <a:p>
               <a:r>
-                <a:rPr lang="en-US" sz="1200" dirty="0">
+                <a:rPr lang="en-US" sz="1600" dirty="0">
                   <a:cs typeface="Arial"/>
                 </a:rPr>
                 <a:t>Modality 4: Speech</a:t>
               </a:r>
-              <a:endParaRPr lang="en-US" sz="1200" dirty="0">
+              <a:endParaRPr lang="en-US" sz="1600" dirty="0">
                 <a:cs typeface="Calibri"/>
               </a:endParaRPr>
             </a:p>
@@ -18149,7 +21370,7 @@
           </p:nvSpPr>
           <p:spPr>
             <a:xfrm>
-              <a:off x="1354253" y="959451"/>
+              <a:off x="791296" y="977681"/>
               <a:ext cx="1442922" cy="587820"/>
             </a:xfrm>
             <a:prstGeom prst="roundRect">
@@ -18186,7 +21407,7 @@
             <a:p>
               <a:pPr algn="ctr"/>
               <a:r>
-                <a:rPr lang="en-US" sz="1400" dirty="0">
+                <a:rPr lang="en-US" dirty="0">
                   <a:solidFill>
                     <a:srgbClr val="000000"/>
                   </a:solidFill>
@@ -18194,7 +21415,7 @@
                 </a:rPr>
                 <a:t>This is a red apple.</a:t>
               </a:r>
-              <a:endParaRPr lang="en-US" sz="1400" dirty="0">
+              <a:endParaRPr lang="en-US" dirty="0">
                 <a:solidFill>
                   <a:srgbClr val="000000"/>
                 </a:solidFill>
@@ -18218,8 +21439,8 @@
           </p:nvSpPr>
           <p:spPr>
             <a:xfrm>
-              <a:off x="3533222" y="870812"/>
-              <a:ext cx="92784" cy="815280"/>
+              <a:off x="3414632" y="854729"/>
+              <a:ext cx="92784" cy="815281"/>
             </a:xfrm>
             <a:prstGeom prst="roundRect">
               <a:avLst/>
@@ -18267,7 +21488,7 @@
           </p:nvSpPr>
           <p:spPr>
             <a:xfrm>
-              <a:off x="3529806" y="1943025"/>
+              <a:off x="3411215" y="1926941"/>
               <a:ext cx="92784" cy="815280"/>
             </a:xfrm>
             <a:prstGeom prst="roundRect">
@@ -18316,7 +21537,7 @@
           </p:nvSpPr>
           <p:spPr>
             <a:xfrm>
-              <a:off x="3534507" y="3220563"/>
+              <a:off x="3371635" y="3212307"/>
               <a:ext cx="92784" cy="815280"/>
             </a:xfrm>
             <a:prstGeom prst="roundRect">
@@ -18365,7 +21586,7 @@
           </p:nvSpPr>
           <p:spPr>
             <a:xfrm>
-              <a:off x="3529353" y="4446629"/>
+              <a:off x="3410763" y="4430546"/>
               <a:ext cx="92784" cy="815280"/>
             </a:xfrm>
             <a:prstGeom prst="roundRect">
@@ -18855,8 +22076,8 @@
           </p:nvSpPr>
           <p:spPr>
             <a:xfrm>
-              <a:off x="2834875" y="1065401"/>
-              <a:ext cx="679015" cy="396547"/>
+              <a:off x="2265118" y="1049317"/>
+              <a:ext cx="1130183" cy="396547"/>
             </a:xfrm>
             <a:prstGeom prst="rightArrow">
               <a:avLst/>
@@ -18884,7 +22105,7 @@
             <a:p>
               <a:pPr algn="ctr"/>
               <a:r>
-                <a:rPr lang="en-US" sz="1100" dirty="0"/>
+                <a:rPr lang="en-US" dirty="0"/>
                 <a:t>BERT</a:t>
               </a:r>
             </a:p>
@@ -18904,8 +22125,8 @@
           </p:nvSpPr>
           <p:spPr>
             <a:xfrm>
-              <a:off x="2685715" y="4655996"/>
-              <a:ext cx="822027" cy="396547"/>
+              <a:off x="2225989" y="4639913"/>
+              <a:ext cx="1163162" cy="396547"/>
             </a:xfrm>
             <a:prstGeom prst="rightArrow">
               <a:avLst/>
@@ -18933,7 +22154,7 @@
             <a:p>
               <a:pPr algn="ctr"/>
               <a:r>
-                <a:rPr lang="en-US" sz="1100" dirty="0"/>
+                <a:rPr lang="en-US" dirty="0"/>
                 <a:t>BERT</a:t>
               </a:r>
             </a:p>
@@ -18953,8 +22174,8 @@
           </p:nvSpPr>
           <p:spPr>
             <a:xfrm>
-              <a:off x="2660947" y="2148244"/>
-              <a:ext cx="856080" cy="396547"/>
+              <a:off x="2213379" y="2132160"/>
+              <a:ext cx="1185059" cy="396547"/>
             </a:xfrm>
             <a:prstGeom prst="rightArrow">
               <a:avLst/>
@@ -18982,7 +22203,7 @@
             <a:p>
               <a:pPr algn="ctr"/>
               <a:r>
-                <a:rPr lang="en-US" sz="1100" dirty="0"/>
+                <a:rPr lang="en-US" dirty="0"/>
                 <a:t>ResNet152</a:t>
               </a:r>
             </a:p>
@@ -19002,8 +22223,8 @@
           </p:nvSpPr>
           <p:spPr>
             <a:xfrm>
-              <a:off x="2660947" y="3417128"/>
-              <a:ext cx="862595" cy="396547"/>
+              <a:off x="2190716" y="3408871"/>
+              <a:ext cx="1169954" cy="396547"/>
             </a:xfrm>
             <a:prstGeom prst="rightArrow">
               <a:avLst/>
@@ -19031,7 +22252,7 @@
             <a:p>
               <a:pPr algn="ctr"/>
               <a:r>
-                <a:rPr lang="en-US" sz="1100" dirty="0"/>
+                <a:rPr lang="en-US" dirty="0"/>
                 <a:t>ResNet152</a:t>
               </a:r>
             </a:p>
@@ -19051,8 +22272,8 @@
           </p:nvSpPr>
           <p:spPr>
             <a:xfrm flipH="1">
-              <a:off x="8768626" y="1094854"/>
-              <a:ext cx="799795" cy="396547"/>
+              <a:off x="8768625" y="1094854"/>
+              <a:ext cx="1049964" cy="396547"/>
             </a:xfrm>
             <a:prstGeom prst="rightArrow">
               <a:avLst/>
@@ -19080,7 +22301,7 @@
             <a:p>
               <a:pPr algn="ctr"/>
               <a:r>
-                <a:rPr lang="en-US" sz="1100" dirty="0"/>
+                <a:rPr lang="en-US" dirty="0"/>
                 <a:t>BERT</a:t>
               </a:r>
             </a:p>
@@ -19100,8 +22321,8 @@
           </p:nvSpPr>
           <p:spPr>
             <a:xfrm flipH="1">
-              <a:off x="8785833" y="4669523"/>
-              <a:ext cx="749988" cy="396547"/>
+              <a:off x="8785831" y="4669523"/>
+              <a:ext cx="1032758" cy="396547"/>
             </a:xfrm>
             <a:prstGeom prst="rightArrow">
               <a:avLst/>
@@ -19129,7 +22350,7 @@
             <a:p>
               <a:pPr algn="ctr"/>
               <a:r>
-                <a:rPr lang="en-US" sz="1100" dirty="0"/>
+                <a:rPr lang="en-US" dirty="0"/>
                 <a:t>BERT</a:t>
               </a:r>
             </a:p>
@@ -19149,8 +22370,8 @@
           </p:nvSpPr>
           <p:spPr>
             <a:xfrm flipH="1">
-              <a:off x="8768626" y="2192159"/>
-              <a:ext cx="879093" cy="396547"/>
+              <a:off x="8768625" y="2192159"/>
+              <a:ext cx="1154065" cy="396547"/>
             </a:xfrm>
             <a:prstGeom prst="rightArrow">
               <a:avLst/>
@@ -19178,7 +22399,7 @@
             <a:p>
               <a:pPr algn="ctr"/>
               <a:r>
-                <a:rPr lang="en-US" sz="1100" dirty="0"/>
+                <a:rPr lang="en-US" dirty="0"/>
                 <a:t>ResNet152</a:t>
               </a:r>
             </a:p>
@@ -19198,8 +22419,8 @@
           </p:nvSpPr>
           <p:spPr>
             <a:xfrm flipH="1">
-              <a:off x="8774660" y="3416550"/>
-              <a:ext cx="857156" cy="396547"/>
+              <a:off x="8774659" y="3416550"/>
+              <a:ext cx="1125267" cy="396547"/>
             </a:xfrm>
             <a:prstGeom prst="rightArrow">
               <a:avLst/>
@@ -19227,7 +22448,7 @@
             <a:p>
               <a:pPr algn="ctr"/>
               <a:r>
-                <a:rPr lang="en-US" sz="1100" dirty="0"/>
+                <a:rPr lang="en-US" dirty="0"/>
                 <a:t>ResNet152</a:t>
               </a:r>
             </a:p>
@@ -19247,8 +22468,8 @@
           </p:nvSpPr>
           <p:spPr>
             <a:xfrm flipH="1">
-              <a:off x="7778780" y="1084864"/>
-              <a:ext cx="835433" cy="396547"/>
+              <a:off x="7515694" y="1084864"/>
+              <a:ext cx="1098519" cy="396547"/>
             </a:xfrm>
             <a:prstGeom prst="rightArrow">
               <a:avLst/>
@@ -19282,7 +22503,7 @@
             <a:p>
               <a:pPr algn="ctr"/>
               <a:r>
-                <a:rPr lang="en-US" sz="1100" dirty="0"/>
+                <a:rPr lang="en-US" dirty="0"/>
                 <a:t>3 FC layers</a:t>
               </a:r>
             </a:p>
@@ -19302,8 +22523,8 @@
           </p:nvSpPr>
           <p:spPr>
             <a:xfrm flipH="1">
-              <a:off x="7798957" y="2181741"/>
-              <a:ext cx="835433" cy="396547"/>
+              <a:off x="7535871" y="2181741"/>
+              <a:ext cx="1098519" cy="396547"/>
             </a:xfrm>
             <a:prstGeom prst="rightArrow">
               <a:avLst/>
@@ -19337,7 +22558,7 @@
             <a:p>
               <a:pPr algn="ctr"/>
               <a:r>
-                <a:rPr lang="en-US" sz="1100" dirty="0"/>
+                <a:rPr lang="en-US" dirty="0"/>
                 <a:t>3 FC layers</a:t>
               </a:r>
             </a:p>
@@ -19357,8 +22578,8 @@
           </p:nvSpPr>
           <p:spPr>
             <a:xfrm flipH="1">
-              <a:off x="7778469" y="4669523"/>
-              <a:ext cx="835433" cy="396547"/>
+              <a:off x="7515383" y="4669523"/>
+              <a:ext cx="1098519" cy="396547"/>
             </a:xfrm>
             <a:prstGeom prst="rightArrow">
               <a:avLst/>
@@ -19392,7 +22613,7 @@
             <a:p>
               <a:pPr algn="ctr"/>
               <a:r>
-                <a:rPr lang="en-US" sz="1100" dirty="0"/>
+                <a:rPr lang="en-US" dirty="0"/>
                 <a:t>3 FC layers</a:t>
               </a:r>
             </a:p>
@@ -19412,8 +22633,8 @@
           </p:nvSpPr>
           <p:spPr>
             <a:xfrm flipH="1">
-              <a:off x="7785761" y="3416550"/>
-              <a:ext cx="835433" cy="396547"/>
+              <a:off x="7522675" y="3416551"/>
+              <a:ext cx="1098519" cy="396547"/>
             </a:xfrm>
             <a:prstGeom prst="rightArrow">
               <a:avLst/>
@@ -19447,7 +22668,7 @@
             <a:p>
               <a:pPr algn="ctr"/>
               <a:r>
-                <a:rPr lang="en-US" sz="1100" dirty="0"/>
+                <a:rPr lang="en-US" dirty="0"/>
                 <a:t>3 FC layers</a:t>
               </a:r>
             </a:p>
@@ -19467,8 +22688,8 @@
           </p:nvSpPr>
           <p:spPr>
             <a:xfrm>
-              <a:off x="3642883" y="1091392"/>
-              <a:ext cx="853745" cy="396547"/>
+              <a:off x="3539965" y="1046013"/>
+              <a:ext cx="1076892" cy="396547"/>
             </a:xfrm>
             <a:prstGeom prst="rightArrow">
               <a:avLst/>
@@ -19502,7 +22723,7 @@
             <a:p>
               <a:pPr algn="ctr"/>
               <a:r>
-                <a:rPr lang="en-US" sz="1100" dirty="0"/>
+                <a:rPr lang="en-US" dirty="0"/>
                 <a:t>3 FC layers</a:t>
               </a:r>
             </a:p>
@@ -19571,8 +22792,8 @@
           </p:nvSpPr>
           <p:spPr>
             <a:xfrm>
-              <a:off x="3642883" y="2175024"/>
-              <a:ext cx="853745" cy="396547"/>
+              <a:off x="3539965" y="2129645"/>
+              <a:ext cx="1076892" cy="396547"/>
             </a:xfrm>
             <a:prstGeom prst="rightArrow">
               <a:avLst/>
@@ -19606,7 +22827,7 @@
             <a:p>
               <a:pPr algn="ctr"/>
               <a:r>
-                <a:rPr lang="en-US" sz="1100" dirty="0"/>
+                <a:rPr lang="en-US" dirty="0"/>
                 <a:t>3 FC layers</a:t>
               </a:r>
             </a:p>
@@ -19675,8 +22896,8 @@
           </p:nvSpPr>
           <p:spPr>
             <a:xfrm>
-              <a:off x="3642883" y="3417128"/>
-              <a:ext cx="853745" cy="396547"/>
+              <a:off x="3495683" y="3425406"/>
+              <a:ext cx="1076892" cy="396547"/>
             </a:xfrm>
             <a:prstGeom prst="rightArrow">
               <a:avLst/>
@@ -19710,7 +22931,7 @@
             <a:p>
               <a:pPr algn="ctr"/>
               <a:r>
-                <a:rPr lang="en-US" sz="1100" dirty="0"/>
+                <a:rPr lang="en-US" dirty="0"/>
                 <a:t>3 FC layers</a:t>
               </a:r>
             </a:p>
@@ -19779,8 +23000,8 @@
           </p:nvSpPr>
           <p:spPr>
             <a:xfrm>
-              <a:off x="3642433" y="4685292"/>
-              <a:ext cx="853745" cy="396547"/>
+              <a:off x="3539515" y="4639913"/>
+              <a:ext cx="1076892" cy="396547"/>
             </a:xfrm>
             <a:prstGeom prst="rightArrow">
               <a:avLst/>
@@ -19814,7 +23035,7 @@
             <a:p>
               <a:pPr algn="ctr"/>
               <a:r>
-                <a:rPr lang="en-US" sz="1100" dirty="0"/>
+                <a:rPr lang="en-US" dirty="0"/>
                 <a:t>3 FC layers</a:t>
               </a:r>
             </a:p>
@@ -19924,18 +23145,17 @@
             </p:cNvPr>
             <p:cNvCxnSpPr>
               <a:cxnSpLocks/>
-              <a:endCxn id="144" idx="1"/>
             </p:cNvCxnSpPr>
             <p:nvPr/>
           </p:nvCxnSpPr>
           <p:spPr>
             <a:xfrm>
-              <a:off x="4910610" y="1279727"/>
+              <a:off x="4997013" y="1303913"/>
               <a:ext cx="10515" cy="3558459"/>
             </a:xfrm>
             <a:prstGeom prst="curvedConnector3">
               <a:avLst>
-                <a:gd name="adj1" fmla="val -3795909"/>
+                <a:gd name="adj1" fmla="val -4243966"/>
               </a:avLst>
             </a:prstGeom>
             <a:ln>
@@ -20151,12 +23371,12 @@
         </p:nvCxnSpPr>
         <p:spPr>
           <a:xfrm rot="10800000" flipV="1">
-            <a:off x="5315610" y="2512435"/>
-            <a:ext cx="12700" cy="1380046"/>
+            <a:off x="5384823" y="2450192"/>
+            <a:ext cx="12700" cy="1212495"/>
           </a:xfrm>
           <a:prstGeom prst="curvedConnector3">
             <a:avLst>
-              <a:gd name="adj1" fmla="val 868969"/>
+              <a:gd name="adj1" fmla="val 1800000"/>
             </a:avLst>
           </a:prstGeom>
           <a:ln>
@@ -20199,12 +23419,12 @@
         </p:nvCxnSpPr>
         <p:spPr>
           <a:xfrm rot="10800000" flipV="1">
-            <a:off x="5315110" y="2512435"/>
-            <a:ext cx="501" cy="2749672"/>
+            <a:off x="5384371" y="2450192"/>
+            <a:ext cx="452" cy="2415835"/>
           </a:xfrm>
           <a:prstGeom prst="curvedConnector3">
             <a:avLst>
-              <a:gd name="adj1" fmla="val 56742715"/>
+              <a:gd name="adj1" fmla="val 50675221"/>
             </a:avLst>
           </a:prstGeom>
           <a:ln>
@@ -20247,12 +23467,12 @@
         </p:nvCxnSpPr>
         <p:spPr>
           <a:xfrm rot="10800000" flipV="1">
-            <a:off x="5315110" y="3892478"/>
-            <a:ext cx="501" cy="1369625"/>
+            <a:off x="5384371" y="3662688"/>
+            <a:ext cx="452" cy="1203340"/>
           </a:xfrm>
           <a:prstGeom prst="curvedConnector3">
             <a:avLst>
-              <a:gd name="adj1" fmla="val 18981038"/>
+              <a:gd name="adj1" fmla="val 50675221"/>
             </a:avLst>
           </a:prstGeom>
           <a:ln>
@@ -20295,8 +23515,8 @@
         </p:nvCxnSpPr>
         <p:spPr>
           <a:xfrm flipV="1">
-            <a:off x="5418698" y="1312252"/>
-            <a:ext cx="2632558" cy="1200181"/>
+            <a:off x="5477966" y="1395725"/>
+            <a:ext cx="2378581" cy="1054468"/>
           </a:xfrm>
           <a:prstGeom prst="line">
             <a:avLst/>
@@ -20338,8 +23558,8 @@
         </p:nvCxnSpPr>
         <p:spPr>
           <a:xfrm>
-            <a:off x="5418698" y="2512433"/>
-            <a:ext cx="2632558" cy="18509"/>
+            <a:off x="5477966" y="2450193"/>
+            <a:ext cx="2378581" cy="16262"/>
           </a:xfrm>
           <a:prstGeom prst="line">
             <a:avLst/>
@@ -20381,8 +23601,8 @@
         </p:nvCxnSpPr>
         <p:spPr>
           <a:xfrm>
-            <a:off x="5418698" y="2512433"/>
-            <a:ext cx="2634770" cy="1391593"/>
+            <a:off x="5477966" y="2450193"/>
+            <a:ext cx="2380579" cy="1222641"/>
           </a:xfrm>
           <a:prstGeom prst="line">
             <a:avLst/>
@@ -20424,8 +23644,8 @@
         </p:nvCxnSpPr>
         <p:spPr>
           <a:xfrm>
-            <a:off x="5418698" y="2512433"/>
-            <a:ext cx="2651676" cy="2776543"/>
+            <a:off x="5477966" y="2450193"/>
+            <a:ext cx="2395854" cy="2439444"/>
           </a:xfrm>
           <a:prstGeom prst="line">
             <a:avLst/>
@@ -20467,8 +23687,8 @@
         </p:nvCxnSpPr>
         <p:spPr>
           <a:xfrm flipV="1">
-            <a:off x="5418698" y="1312252"/>
-            <a:ext cx="2632558" cy="2580227"/>
+            <a:off x="5477966" y="1395725"/>
+            <a:ext cx="2378581" cy="2266963"/>
           </a:xfrm>
           <a:prstGeom prst="line">
             <a:avLst/>
@@ -20510,8 +23730,8 @@
         </p:nvCxnSpPr>
         <p:spPr>
           <a:xfrm flipV="1">
-            <a:off x="5418197" y="1312252"/>
-            <a:ext cx="2633059" cy="3949852"/>
+            <a:off x="5477514" y="1395725"/>
+            <a:ext cx="2379033" cy="3470303"/>
           </a:xfrm>
           <a:prstGeom prst="line">
             <a:avLst/>
@@ -20553,8 +23773,8 @@
         </p:nvCxnSpPr>
         <p:spPr>
           <a:xfrm flipV="1">
-            <a:off x="5418698" y="2530942"/>
-            <a:ext cx="2632558" cy="1361537"/>
+            <a:off x="5477966" y="2466455"/>
+            <a:ext cx="2378581" cy="1196233"/>
           </a:xfrm>
           <a:prstGeom prst="line">
             <a:avLst/>
@@ -20596,8 +23816,8 @@
         </p:nvCxnSpPr>
         <p:spPr>
           <a:xfrm>
-            <a:off x="5418698" y="3892479"/>
-            <a:ext cx="2634770" cy="11547"/>
+            <a:off x="5477966" y="3662688"/>
+            <a:ext cx="2380579" cy="10146"/>
           </a:xfrm>
           <a:prstGeom prst="line">
             <a:avLst/>
@@ -20639,8 +23859,8 @@
         </p:nvCxnSpPr>
         <p:spPr>
           <a:xfrm>
-            <a:off x="5418698" y="3892479"/>
-            <a:ext cx="2651676" cy="1396497"/>
+            <a:off x="5477966" y="3662688"/>
+            <a:ext cx="2395854" cy="1226949"/>
           </a:xfrm>
           <a:prstGeom prst="line">
             <a:avLst/>
@@ -20682,8 +23902,8 @@
         </p:nvCxnSpPr>
         <p:spPr>
           <a:xfrm>
-            <a:off x="5418197" y="5262104"/>
-            <a:ext cx="2652177" cy="26872"/>
+            <a:off x="5477514" y="4866028"/>
+            <a:ext cx="2396306" cy="23609"/>
           </a:xfrm>
           <a:prstGeom prst="line">
             <a:avLst/>
@@ -20725,8 +23945,8 @@
         </p:nvCxnSpPr>
         <p:spPr>
           <a:xfrm flipV="1">
-            <a:off x="5418197" y="3904026"/>
-            <a:ext cx="2635271" cy="1358078"/>
+            <a:off x="5477514" y="3672834"/>
+            <a:ext cx="2381031" cy="1193194"/>
           </a:xfrm>
           <a:prstGeom prst="line">
             <a:avLst/>
@@ -20768,8 +23988,8 @@
         </p:nvCxnSpPr>
         <p:spPr>
           <a:xfrm flipV="1">
-            <a:off x="5418197" y="2530942"/>
-            <a:ext cx="2633059" cy="2731162"/>
+            <a:off x="5477514" y="2466455"/>
+            <a:ext cx="2379033" cy="2399573"/>
           </a:xfrm>
           <a:prstGeom prst="line">
             <a:avLst/>

</xml_diff>